<commit_message>
Added license statements to all files, and finished first edition of the user and developer manuals.  The manuals are still pretty basic, but they make the package more stand-alone
</commit_message>
<xml_diff>
--- a/docs/img/3_MG_In_Time_Iterations.pptx
+++ b/docs/img/3_MG_In_Time_Iterations.pptx
@@ -6,6 +6,7 @@
   </p:sldMasterIdLst>
   <p:sldIdLst>
     <p:sldId id="256" r:id="rId2"/>
+    <p:sldId id="257" r:id="rId3"/>
   </p:sldIdLst>
   <p:sldSz cx="18288000" cy="18288000"/>
   <p:notesSz cx="6858000" cy="9144000"/>
@@ -288,7 +289,7 @@
           <a:p>
             <a:fld id="{25B35073-AD13-6A48-8F8C-739ACC6114D3}" type="datetimeFigureOut">
               <a:rPr lang="en-US" smtClean="0"/>
-              <a:t>7/23/14</a:t>
+              <a:t>7/29/14</a:t>
             </a:fld>
             <a:endParaRPr lang="en-US"/>
           </a:p>
@@ -458,7 +459,7 @@
           <a:p>
             <a:fld id="{25B35073-AD13-6A48-8F8C-739ACC6114D3}" type="datetimeFigureOut">
               <a:rPr lang="en-US" smtClean="0"/>
-              <a:t>7/23/14</a:t>
+              <a:t>7/29/14</a:t>
             </a:fld>
             <a:endParaRPr lang="en-US"/>
           </a:p>
@@ -638,7 +639,7 @@
           <a:p>
             <a:fld id="{25B35073-AD13-6A48-8F8C-739ACC6114D3}" type="datetimeFigureOut">
               <a:rPr lang="en-US" smtClean="0"/>
-              <a:t>7/23/14</a:t>
+              <a:t>7/29/14</a:t>
             </a:fld>
             <a:endParaRPr lang="en-US"/>
           </a:p>
@@ -808,7 +809,7 @@
           <a:p>
             <a:fld id="{25B35073-AD13-6A48-8F8C-739ACC6114D3}" type="datetimeFigureOut">
               <a:rPr lang="en-US" smtClean="0"/>
-              <a:t>7/23/14</a:t>
+              <a:t>7/29/14</a:t>
             </a:fld>
             <a:endParaRPr lang="en-US"/>
           </a:p>
@@ -1054,7 +1055,7 @@
           <a:p>
             <a:fld id="{25B35073-AD13-6A48-8F8C-739ACC6114D3}" type="datetimeFigureOut">
               <a:rPr lang="en-US" smtClean="0"/>
-              <a:t>7/23/14</a:t>
+              <a:t>7/29/14</a:t>
             </a:fld>
             <a:endParaRPr lang="en-US"/>
           </a:p>
@@ -1342,7 +1343,7 @@
           <a:p>
             <a:fld id="{25B35073-AD13-6A48-8F8C-739ACC6114D3}" type="datetimeFigureOut">
               <a:rPr lang="en-US" smtClean="0"/>
-              <a:t>7/23/14</a:t>
+              <a:t>7/29/14</a:t>
             </a:fld>
             <a:endParaRPr lang="en-US"/>
           </a:p>
@@ -1769,7 +1770,7 @@
           <a:p>
             <a:fld id="{25B35073-AD13-6A48-8F8C-739ACC6114D3}" type="datetimeFigureOut">
               <a:rPr lang="en-US" smtClean="0"/>
-              <a:t>7/23/14</a:t>
+              <a:t>7/29/14</a:t>
             </a:fld>
             <a:endParaRPr lang="en-US"/>
           </a:p>
@@ -1887,7 +1888,7 @@
           <a:p>
             <a:fld id="{25B35073-AD13-6A48-8F8C-739ACC6114D3}" type="datetimeFigureOut">
               <a:rPr lang="en-US" smtClean="0"/>
-              <a:t>7/23/14</a:t>
+              <a:t>7/29/14</a:t>
             </a:fld>
             <a:endParaRPr lang="en-US"/>
           </a:p>
@@ -1982,7 +1983,7 @@
           <a:p>
             <a:fld id="{25B35073-AD13-6A48-8F8C-739ACC6114D3}" type="datetimeFigureOut">
               <a:rPr lang="en-US" smtClean="0"/>
-              <a:t>7/23/14</a:t>
+              <a:t>7/29/14</a:t>
             </a:fld>
             <a:endParaRPr lang="en-US"/>
           </a:p>
@@ -2259,7 +2260,7 @@
           <a:p>
             <a:fld id="{25B35073-AD13-6A48-8F8C-739ACC6114D3}" type="datetimeFigureOut">
               <a:rPr lang="en-US" smtClean="0"/>
-              <a:t>7/23/14</a:t>
+              <a:t>7/29/14</a:t>
             </a:fld>
             <a:endParaRPr lang="en-US"/>
           </a:p>
@@ -2512,7 +2513,7 @@
           <a:p>
             <a:fld id="{25B35073-AD13-6A48-8F8C-739ACC6114D3}" type="datetimeFigureOut">
               <a:rPr lang="en-US" smtClean="0"/>
-              <a:t>7/23/14</a:t>
+              <a:t>7/29/14</a:t>
             </a:fld>
             <a:endParaRPr lang="en-US"/>
           </a:p>
@@ -2725,7 +2726,7 @@
           <a:p>
             <a:fld id="{25B35073-AD13-6A48-8F8C-739ACC6114D3}" type="datetimeFigureOut">
               <a:rPr lang="en-US" smtClean="0"/>
-              <a:t>7/23/14</a:t>
+              <a:t>7/29/14</a:t>
             </a:fld>
             <a:endParaRPr lang="en-US"/>
           </a:p>
@@ -3855,11 +3856,6 @@
                       </a:rPr>
                       <a:t>Relaxation on fine time grid</a:t>
                     </a:r>
-                    <a:endParaRPr lang="en-US" sz="1500" b="1" i="1" dirty="0">
-                      <a:solidFill>
-                        <a:srgbClr val="800000"/>
-                      </a:solidFill>
-                    </a:endParaRPr>
                   </a:p>
                 </p:txBody>
               </p:sp>
@@ -3927,11 +3923,6 @@
                       </a:rPr>
                       <a:t>Time</a:t>
                     </a:r>
-                    <a:endParaRPr lang="en-US" sz="1500" dirty="0">
-                      <a:solidFill>
-                        <a:srgbClr val="800000"/>
-                      </a:solidFill>
-                    </a:endParaRPr>
                   </a:p>
                 </p:txBody>
               </p:sp>
@@ -3965,11 +3956,6 @@
                       </a:rPr>
                       <a:t>Space</a:t>
                     </a:r>
-                    <a:endParaRPr lang="en-US" sz="1500" dirty="0">
-                      <a:solidFill>
-                        <a:srgbClr val="800000"/>
-                      </a:solidFill>
-                    </a:endParaRPr>
                   </a:p>
                 </p:txBody>
               </p:sp>
@@ -4098,11 +4084,6 @@
                         </a:rPr>
                         <a:t>Relaxation on first coarse grid</a:t>
                       </a:r>
-                      <a:endParaRPr lang="en-US" sz="1500" b="1" i="1" dirty="0">
-                        <a:solidFill>
-                          <a:srgbClr val="800000"/>
-                        </a:solidFill>
-                      </a:endParaRPr>
                     </a:p>
                   </p:txBody>
                 </p:sp>
@@ -4248,11 +4229,6 @@
                     </a:rPr>
                     <a:t>with fewer time values</a:t>
                   </a:r>
-                  <a:endParaRPr lang="en-US" sz="1500" b="1" i="1" dirty="0">
-                    <a:solidFill>
-                      <a:srgbClr val="800000"/>
-                    </a:solidFill>
-                  </a:endParaRPr>
                 </a:p>
               </p:txBody>
             </p:sp>
@@ -4870,11 +4846,6 @@
                   </a:rPr>
                   <a:t>Relaxation on fine time grid</a:t>
                 </a:r>
-                <a:endParaRPr lang="en-US" sz="1500" b="1" i="1" dirty="0">
-                  <a:solidFill>
-                    <a:srgbClr val="800000"/>
-                  </a:solidFill>
-                </a:endParaRPr>
               </a:p>
             </p:txBody>
           </p:sp>
@@ -4942,11 +4913,6 @@
                   </a:rPr>
                   <a:t>Time</a:t>
                 </a:r>
-                <a:endParaRPr lang="en-US" sz="1500" dirty="0">
-                  <a:solidFill>
-                    <a:srgbClr val="800000"/>
-                  </a:solidFill>
-                </a:endParaRPr>
               </a:p>
             </p:txBody>
           </p:sp>
@@ -4980,11 +4946,6 @@
                   </a:rPr>
                   <a:t>Space</a:t>
                 </a:r>
-                <a:endParaRPr lang="en-US" sz="1500" dirty="0">
-                  <a:solidFill>
-                    <a:srgbClr val="800000"/>
-                  </a:solidFill>
-                </a:endParaRPr>
               </a:p>
             </p:txBody>
           </p:sp>
@@ -5142,11 +5103,6 @@
                     </a:rPr>
                     <a:t>Relaxation on first coarse grid</a:t>
                   </a:r>
-                  <a:endParaRPr lang="en-US" sz="1500" b="1" i="1" dirty="0">
-                    <a:solidFill>
-                      <a:srgbClr val="800000"/>
-                    </a:solidFill>
-                  </a:endParaRPr>
                 </a:p>
               </p:txBody>
             </p:sp>
@@ -6864,6 +6820,3009 @@
 </p:sld>
 </file>
 
+<file path=ppt/slides/slide2.xml><?xml version="1.0" encoding="utf-8"?>
+<p:sld xmlns:a="http://schemas.openxmlformats.org/drawingml/2006/main" xmlns:r="http://schemas.openxmlformats.org/officeDocument/2006/relationships" xmlns:p="http://schemas.openxmlformats.org/presentationml/2006/main">
+  <p:cSld>
+    <p:spTree>
+      <p:nvGrpSpPr>
+        <p:cNvPr id="1" name=""/>
+        <p:cNvGrpSpPr/>
+        <p:nvPr/>
+      </p:nvGrpSpPr>
+      <p:grpSpPr>
+        <a:xfrm>
+          <a:off x="0" y="0"/>
+          <a:ext cx="0" cy="0"/>
+          <a:chOff x="0" y="0"/>
+          <a:chExt cx="0" cy="0"/>
+        </a:xfrm>
+      </p:grpSpPr>
+      <p:grpSp>
+        <p:nvGrpSpPr>
+          <p:cNvPr id="4" name="Group 3"/>
+          <p:cNvGrpSpPr>
+            <a:grpSpLocks noChangeAspect="1"/>
+          </p:cNvGrpSpPr>
+          <p:nvPr/>
+        </p:nvGrpSpPr>
+        <p:grpSpPr>
+          <a:xfrm>
+            <a:off x="0" y="2065524"/>
+            <a:ext cx="4633094" cy="3590432"/>
+            <a:chOff x="4389468" y="2700523"/>
+            <a:chExt cx="4633094" cy="3590432"/>
+          </a:xfrm>
+        </p:grpSpPr>
+        <p:pic>
+          <p:nvPicPr>
+            <p:cNvPr id="5" name="Picture 4"/>
+            <p:cNvPicPr>
+              <a:picLocks/>
+            </p:cNvPicPr>
+            <p:nvPr/>
+          </p:nvPicPr>
+          <p:blipFill rotWithShape="1">
+            <a:blip r:embed="rId2">
+              <a:extLst>
+                <a:ext uri="{28A0092B-C50C-407E-A947-70E740481C1C}">
+                  <a14:useLocalDpi xmlns:a14="http://schemas.microsoft.com/office/drawing/2010/main" val="0"/>
+                </a:ext>
+              </a:extLst>
+            </a:blip>
+            <a:srcRect l="1953" t="21056" r="1801" b="10228"/>
+            <a:stretch/>
+          </p:blipFill>
+          <p:spPr>
+            <a:xfrm>
+              <a:off x="5913583" y="5197761"/>
+              <a:ext cx="1332211" cy="619961"/>
+            </a:xfrm>
+            <a:prstGeom prst="rect">
+              <a:avLst/>
+            </a:prstGeom>
+          </p:spPr>
+        </p:pic>
+        <p:pic>
+          <p:nvPicPr>
+            <p:cNvPr id="6" name="Picture 5"/>
+            <p:cNvPicPr>
+              <a:picLocks/>
+            </p:cNvPicPr>
+            <p:nvPr/>
+          </p:nvPicPr>
+          <p:blipFill rotWithShape="1">
+            <a:blip r:embed="rId2">
+              <a:extLst>
+                <a:ext uri="{28A0092B-C50C-407E-A947-70E740481C1C}">
+                  <a14:useLocalDpi xmlns:a14="http://schemas.microsoft.com/office/drawing/2010/main" val="0"/>
+                </a:ext>
+              </a:extLst>
+            </a:blip>
+            <a:srcRect l="1953" t="21056" r="1801" b="10228"/>
+            <a:stretch/>
+          </p:blipFill>
+          <p:spPr>
+            <a:xfrm>
+              <a:off x="4629727" y="3278908"/>
+              <a:ext cx="2474106" cy="1239923"/>
+            </a:xfrm>
+            <a:prstGeom prst="rect">
+              <a:avLst/>
+            </a:prstGeom>
+          </p:spPr>
+        </p:pic>
+        <p:grpSp>
+          <p:nvGrpSpPr>
+            <p:cNvPr id="7" name="Group 6"/>
+            <p:cNvGrpSpPr/>
+            <p:nvPr/>
+          </p:nvGrpSpPr>
+          <p:grpSpPr>
+            <a:xfrm>
+              <a:off x="4389468" y="2700523"/>
+              <a:ext cx="4633094" cy="3590432"/>
+              <a:chOff x="4389468" y="2700523"/>
+              <a:chExt cx="4633094" cy="3590432"/>
+            </a:xfrm>
+          </p:grpSpPr>
+          <p:grpSp>
+            <p:nvGrpSpPr>
+              <p:cNvPr id="8" name="Group 7"/>
+              <p:cNvGrpSpPr/>
+              <p:nvPr/>
+            </p:nvGrpSpPr>
+            <p:grpSpPr>
+              <a:xfrm>
+                <a:off x="4389468" y="2700523"/>
+                <a:ext cx="4633094" cy="3590432"/>
+                <a:chOff x="4412558" y="2406297"/>
+                <a:chExt cx="4633094" cy="3590432"/>
+              </a:xfrm>
+            </p:grpSpPr>
+            <p:grpSp>
+              <p:nvGrpSpPr>
+                <p:cNvPr id="10" name="Group 9"/>
+                <p:cNvGrpSpPr/>
+                <p:nvPr/>
+              </p:nvGrpSpPr>
+              <p:grpSpPr>
+                <a:xfrm>
+                  <a:off x="4412558" y="2406297"/>
+                  <a:ext cx="4633094" cy="3590432"/>
+                  <a:chOff x="4445333" y="2496415"/>
+                  <a:chExt cx="4633094" cy="3590432"/>
+                </a:xfrm>
+              </p:grpSpPr>
+              <p:sp>
+                <p:nvSpPr>
+                  <p:cNvPr id="13" name="Freeform 6"/>
+                  <p:cNvSpPr>
+                    <a:spLocks/>
+                  </p:cNvSpPr>
+                  <p:nvPr/>
+                </p:nvSpPr>
+                <p:spPr bwMode="auto">
+                  <a:xfrm>
+                    <a:off x="6187733" y="4005521"/>
+                    <a:ext cx="13187" cy="13373"/>
+                  </a:xfrm>
+                  <a:custGeom>
+                    <a:avLst/>
+                    <a:gdLst>
+                      <a:gd name="T0" fmla="*/ 0 w 17"/>
+                      <a:gd name="T1" fmla="*/ 0 h 17"/>
+                      <a:gd name="T2" fmla="*/ 2147483647 w 17"/>
+                      <a:gd name="T3" fmla="*/ 0 h 17"/>
+                      <a:gd name="T4" fmla="*/ 2147483647 w 17"/>
+                      <a:gd name="T5" fmla="*/ 2147483647 h 17"/>
+                      <a:gd name="T6" fmla="*/ 0 w 17"/>
+                      <a:gd name="T7" fmla="*/ 2147483647 h 17"/>
+                      <a:gd name="T8" fmla="*/ 0 w 17"/>
+                      <a:gd name="T9" fmla="*/ 0 h 17"/>
+                      <a:gd name="T10" fmla="*/ 0 60000 65536"/>
+                      <a:gd name="T11" fmla="*/ 0 60000 65536"/>
+                      <a:gd name="T12" fmla="*/ 0 60000 65536"/>
+                      <a:gd name="T13" fmla="*/ 0 60000 65536"/>
+                      <a:gd name="T14" fmla="*/ 0 60000 65536"/>
+                      <a:gd name="T15" fmla="*/ 0 w 17"/>
+                      <a:gd name="T16" fmla="*/ 0 h 17"/>
+                      <a:gd name="T17" fmla="*/ 17 w 17"/>
+                      <a:gd name="T18" fmla="*/ 17 h 17"/>
+                    </a:gdLst>
+                    <a:ahLst/>
+                    <a:cxnLst>
+                      <a:cxn ang="T10">
+                        <a:pos x="T0" y="T1"/>
+                      </a:cxn>
+                      <a:cxn ang="T11">
+                        <a:pos x="T2" y="T3"/>
+                      </a:cxn>
+                      <a:cxn ang="T12">
+                        <a:pos x="T4" y="T5"/>
+                      </a:cxn>
+                      <a:cxn ang="T13">
+                        <a:pos x="T6" y="T7"/>
+                      </a:cxn>
+                      <a:cxn ang="T14">
+                        <a:pos x="T8" y="T9"/>
+                      </a:cxn>
+                    </a:cxnLst>
+                    <a:rect l="T15" t="T16" r="T17" b="T18"/>
+                    <a:pathLst>
+                      <a:path w="17" h="17">
+                        <a:moveTo>
+                          <a:pt x="0" y="0"/>
+                        </a:moveTo>
+                        <a:lnTo>
+                          <a:pt x="16" y="0"/>
+                        </a:lnTo>
+                        <a:lnTo>
+                          <a:pt x="16" y="16"/>
+                        </a:lnTo>
+                        <a:lnTo>
+                          <a:pt x="0" y="16"/>
+                        </a:lnTo>
+                        <a:lnTo>
+                          <a:pt x="0" y="0"/>
+                        </a:lnTo>
+                      </a:path>
+                    </a:pathLst>
+                  </a:custGeom>
+                  <a:solidFill>
+                    <a:srgbClr val="FFFFFF"/>
+                  </a:solidFill>
+                  <a:ln w="9525" cap="rnd">
+                    <a:noFill/>
+                    <a:round/>
+                    <a:headEnd type="none" w="sm" len="sm"/>
+                    <a:tailEnd type="none" w="sm" len="sm"/>
+                  </a:ln>
+                </p:spPr>
+                <p:txBody>
+                  <a:bodyPr/>
+                  <a:lstStyle/>
+                  <a:p>
+                    <a:endParaRPr lang="en-US" dirty="0"/>
+                  </a:p>
+                </p:txBody>
+              </p:sp>
+              <p:sp>
+                <p:nvSpPr>
+                  <p:cNvPr id="14" name="Freeform 17"/>
+                  <p:cNvSpPr>
+                    <a:spLocks/>
+                  </p:cNvSpPr>
+                  <p:nvPr/>
+                </p:nvSpPr>
+                <p:spPr bwMode="auto">
+                  <a:xfrm>
+                    <a:off x="6034204" y="5202354"/>
+                    <a:ext cx="12245" cy="13373"/>
+                  </a:xfrm>
+                  <a:custGeom>
+                    <a:avLst/>
+                    <a:gdLst>
+                      <a:gd name="T0" fmla="*/ 0 w 17"/>
+                      <a:gd name="T1" fmla="*/ 0 h 17"/>
+                      <a:gd name="T2" fmla="*/ 2147483647 w 17"/>
+                      <a:gd name="T3" fmla="*/ 0 h 17"/>
+                      <a:gd name="T4" fmla="*/ 2147483647 w 17"/>
+                      <a:gd name="T5" fmla="*/ 2147483647 h 17"/>
+                      <a:gd name="T6" fmla="*/ 0 w 17"/>
+                      <a:gd name="T7" fmla="*/ 2147483647 h 17"/>
+                      <a:gd name="T8" fmla="*/ 0 w 17"/>
+                      <a:gd name="T9" fmla="*/ 0 h 17"/>
+                      <a:gd name="T10" fmla="*/ 0 60000 65536"/>
+                      <a:gd name="T11" fmla="*/ 0 60000 65536"/>
+                      <a:gd name="T12" fmla="*/ 0 60000 65536"/>
+                      <a:gd name="T13" fmla="*/ 0 60000 65536"/>
+                      <a:gd name="T14" fmla="*/ 0 60000 65536"/>
+                      <a:gd name="T15" fmla="*/ 0 w 17"/>
+                      <a:gd name="T16" fmla="*/ 0 h 17"/>
+                      <a:gd name="T17" fmla="*/ 17 w 17"/>
+                      <a:gd name="T18" fmla="*/ 17 h 17"/>
+                    </a:gdLst>
+                    <a:ahLst/>
+                    <a:cxnLst>
+                      <a:cxn ang="T10">
+                        <a:pos x="T0" y="T1"/>
+                      </a:cxn>
+                      <a:cxn ang="T11">
+                        <a:pos x="T2" y="T3"/>
+                      </a:cxn>
+                      <a:cxn ang="T12">
+                        <a:pos x="T4" y="T5"/>
+                      </a:cxn>
+                      <a:cxn ang="T13">
+                        <a:pos x="T6" y="T7"/>
+                      </a:cxn>
+                      <a:cxn ang="T14">
+                        <a:pos x="T8" y="T9"/>
+                      </a:cxn>
+                    </a:cxnLst>
+                    <a:rect l="T15" t="T16" r="T17" b="T18"/>
+                    <a:pathLst>
+                      <a:path w="17" h="17">
+                        <a:moveTo>
+                          <a:pt x="0" y="0"/>
+                        </a:moveTo>
+                        <a:lnTo>
+                          <a:pt x="16" y="0"/>
+                        </a:lnTo>
+                        <a:lnTo>
+                          <a:pt x="16" y="16"/>
+                        </a:lnTo>
+                        <a:lnTo>
+                          <a:pt x="0" y="16"/>
+                        </a:lnTo>
+                        <a:lnTo>
+                          <a:pt x="0" y="0"/>
+                        </a:lnTo>
+                      </a:path>
+                    </a:pathLst>
+                  </a:custGeom>
+                  <a:solidFill>
+                    <a:srgbClr val="FFFFFF"/>
+                  </a:solidFill>
+                  <a:ln w="9525" cap="rnd">
+                    <a:noFill/>
+                    <a:round/>
+                    <a:headEnd type="none" w="sm" len="sm"/>
+                    <a:tailEnd type="none" w="sm" len="sm"/>
+                  </a:ln>
+                </p:spPr>
+                <p:txBody>
+                  <a:bodyPr/>
+                  <a:lstStyle/>
+                  <a:p>
+                    <a:endParaRPr lang="en-US" dirty="0"/>
+                  </a:p>
+                </p:txBody>
+              </p:sp>
+              <p:sp>
+                <p:nvSpPr>
+                  <p:cNvPr id="15" name="Rectangle 23"/>
+                  <p:cNvSpPr>
+                    <a:spLocks noChangeArrowheads="1"/>
+                  </p:cNvSpPr>
+                  <p:nvPr/>
+                </p:nvSpPr>
+                <p:spPr bwMode="auto">
+                  <a:xfrm>
+                    <a:off x="8854255" y="3585244"/>
+                    <a:ext cx="224172" cy="146142"/>
+                  </a:xfrm>
+                  <a:prstGeom prst="rect">
+                    <a:avLst/>
+                  </a:prstGeom>
+                  <a:noFill/>
+                  <a:ln w="25400">
+                    <a:solidFill>
+                      <a:schemeClr val="tx1"/>
+                    </a:solidFill>
+                    <a:miter lim="800000"/>
+                    <a:headEnd/>
+                    <a:tailEnd/>
+                  </a:ln>
+                </p:spPr>
+                <p:txBody>
+                  <a:bodyPr wrap="none" anchor="ctr"/>
+                  <a:lstStyle/>
+                  <a:p>
+                    <a:endParaRPr lang="en-US" dirty="0"/>
+                  </a:p>
+                </p:txBody>
+              </p:sp>
+              <p:sp>
+                <p:nvSpPr>
+                  <p:cNvPr id="16" name="Line 25"/>
+                  <p:cNvSpPr>
+                    <a:spLocks noChangeShapeType="1"/>
+                  </p:cNvSpPr>
+                  <p:nvPr/>
+                </p:nvSpPr>
+                <p:spPr bwMode="auto">
+                  <a:xfrm flipV="1">
+                    <a:off x="8282521" y="3738074"/>
+                    <a:ext cx="634841" cy="1225488"/>
+                  </a:xfrm>
+                  <a:prstGeom prst="line">
+                    <a:avLst/>
+                  </a:prstGeom>
+                  <a:noFill/>
+                  <a:ln w="25400">
+                    <a:solidFill>
+                      <a:schemeClr val="tx1"/>
+                    </a:solidFill>
+                    <a:round/>
+                    <a:headEnd type="none" w="sm" len="sm"/>
+                    <a:tailEnd type="stealth" w="med" len="lg"/>
+                  </a:ln>
+                </p:spPr>
+                <p:txBody>
+                  <a:bodyPr wrap="none" anchor="ctr"/>
+                  <a:lstStyle/>
+                  <a:p>
+                    <a:endParaRPr lang="en-US" dirty="0"/>
+                  </a:p>
+                </p:txBody>
+              </p:sp>
+              <p:sp>
+                <p:nvSpPr>
+                  <p:cNvPr id="17" name="Line 26"/>
+                  <p:cNvSpPr>
+                    <a:spLocks noChangeShapeType="1"/>
+                  </p:cNvSpPr>
+                  <p:nvPr/>
+                </p:nvSpPr>
+                <p:spPr bwMode="auto">
+                  <a:xfrm>
+                    <a:off x="7396192" y="5236740"/>
+                    <a:ext cx="390889" cy="699187"/>
+                  </a:xfrm>
+                  <a:prstGeom prst="line">
+                    <a:avLst/>
+                  </a:prstGeom>
+                  <a:noFill/>
+                  <a:ln w="25400">
+                    <a:solidFill>
+                      <a:schemeClr val="tx1"/>
+                    </a:solidFill>
+                    <a:prstDash val="dash"/>
+                    <a:round/>
+                    <a:headEnd type="none" w="sm" len="sm"/>
+                    <a:tailEnd type="stealth" w="med" len="lg"/>
+                  </a:ln>
+                </p:spPr>
+                <p:txBody>
+                  <a:bodyPr wrap="none" anchor="ctr"/>
+                  <a:lstStyle/>
+                  <a:p>
+                    <a:endParaRPr lang="en-US" dirty="0"/>
+                  </a:p>
+                </p:txBody>
+              </p:sp>
+              <p:sp>
+                <p:nvSpPr>
+                  <p:cNvPr id="18" name="Line 27"/>
+                  <p:cNvSpPr>
+                    <a:spLocks noChangeShapeType="1"/>
+                  </p:cNvSpPr>
+                  <p:nvPr/>
+                </p:nvSpPr>
+                <p:spPr bwMode="auto">
+                  <a:xfrm flipV="1">
+                    <a:off x="7794616" y="5114478"/>
+                    <a:ext cx="413494" cy="818585"/>
+                  </a:xfrm>
+                  <a:prstGeom prst="line">
+                    <a:avLst/>
+                  </a:prstGeom>
+                  <a:noFill/>
+                  <a:ln w="25400">
+                    <a:solidFill>
+                      <a:schemeClr val="tx1"/>
+                    </a:solidFill>
+                    <a:prstDash val="dash"/>
+                    <a:round/>
+                    <a:headEnd type="none" w="sm" len="sm"/>
+                    <a:tailEnd type="stealth" w="med" len="lg"/>
+                  </a:ln>
+                </p:spPr>
+                <p:txBody>
+                  <a:bodyPr wrap="none" anchor="ctr"/>
+                  <a:lstStyle/>
+                  <a:p>
+                    <a:endParaRPr lang="en-US" dirty="0"/>
+                  </a:p>
+                </p:txBody>
+              </p:sp>
+              <p:sp>
+                <p:nvSpPr>
+                  <p:cNvPr id="19" name="Rectangle 28"/>
+                  <p:cNvSpPr>
+                    <a:spLocks noChangeArrowheads="1"/>
+                  </p:cNvSpPr>
+                  <p:nvPr/>
+                </p:nvSpPr>
+                <p:spPr bwMode="auto">
+                  <a:xfrm>
+                    <a:off x="8163842" y="4964517"/>
+                    <a:ext cx="224172" cy="145187"/>
+                  </a:xfrm>
+                  <a:prstGeom prst="rect">
+                    <a:avLst/>
+                  </a:prstGeom>
+                  <a:noFill/>
+                  <a:ln w="25400">
+                    <a:solidFill>
+                      <a:schemeClr val="tx1"/>
+                    </a:solidFill>
+                    <a:miter lim="800000"/>
+                    <a:headEnd/>
+                    <a:tailEnd/>
+                  </a:ln>
+                </p:spPr>
+                <p:txBody>
+                  <a:bodyPr wrap="none" anchor="ctr"/>
+                  <a:lstStyle/>
+                  <a:p>
+                    <a:endParaRPr lang="en-US" dirty="0"/>
+                  </a:p>
+                </p:txBody>
+              </p:sp>
+              <p:sp>
+                <p:nvSpPr>
+                  <p:cNvPr id="20" name="Rectangle 29"/>
+                  <p:cNvSpPr>
+                    <a:spLocks noChangeArrowheads="1"/>
+                  </p:cNvSpPr>
+                  <p:nvPr/>
+                </p:nvSpPr>
+                <p:spPr bwMode="auto">
+                  <a:xfrm>
+                    <a:off x="7687239" y="5940705"/>
+                    <a:ext cx="224172" cy="146142"/>
+                  </a:xfrm>
+                  <a:prstGeom prst="rect">
+                    <a:avLst/>
+                  </a:prstGeom>
+                  <a:noFill/>
+                  <a:ln w="25400">
+                    <a:solidFill>
+                      <a:schemeClr val="tx1"/>
+                    </a:solidFill>
+                    <a:miter lim="800000"/>
+                    <a:headEnd/>
+                    <a:tailEnd/>
+                  </a:ln>
+                </p:spPr>
+                <p:txBody>
+                  <a:bodyPr wrap="none" anchor="ctr"/>
+                  <a:lstStyle/>
+                  <a:p>
+                    <a:endParaRPr lang="en-US" dirty="0"/>
+                  </a:p>
+                </p:txBody>
+              </p:sp>
+              <p:sp>
+                <p:nvSpPr>
+                  <p:cNvPr id="21" name="Line 24"/>
+                  <p:cNvSpPr>
+                    <a:spLocks noChangeShapeType="1"/>
+                  </p:cNvSpPr>
+                  <p:nvPr/>
+                </p:nvSpPr>
+                <p:spPr bwMode="auto">
+                  <a:xfrm>
+                    <a:off x="7045805" y="4602505"/>
+                    <a:ext cx="198741" cy="358190"/>
+                  </a:xfrm>
+                  <a:prstGeom prst="line">
+                    <a:avLst/>
+                  </a:prstGeom>
+                  <a:noFill/>
+                  <a:ln w="25400">
+                    <a:solidFill>
+                      <a:schemeClr val="tx1"/>
+                    </a:solidFill>
+                    <a:round/>
+                    <a:headEnd type="none" w="sm" len="sm"/>
+                    <a:tailEnd type="stealth" w="med" len="lg"/>
+                  </a:ln>
+                </p:spPr>
+                <p:txBody>
+                  <a:bodyPr wrap="none" anchor="ctr"/>
+                  <a:lstStyle/>
+                  <a:p>
+                    <a:endParaRPr lang="en-US" dirty="0"/>
+                  </a:p>
+                </p:txBody>
+              </p:sp>
+              <p:sp>
+                <p:nvSpPr>
+                  <p:cNvPr id="22" name="Text Box 30"/>
+                  <p:cNvSpPr txBox="1">
+                    <a:spLocks noChangeArrowheads="1"/>
+                  </p:cNvSpPr>
+                  <p:nvPr/>
+                </p:nvSpPr>
+                <p:spPr bwMode="auto">
+                  <a:xfrm>
+                    <a:off x="7155127" y="4620786"/>
+                    <a:ext cx="1009273" cy="323165"/>
+                  </a:xfrm>
+                  <a:prstGeom prst="rect">
+                    <a:avLst/>
+                  </a:prstGeom>
+                  <a:noFill/>
+                  <a:ln w="12700">
+                    <a:noFill/>
+                    <a:miter lim="800000"/>
+                    <a:headEnd type="none" w="sm" len="sm"/>
+                    <a:tailEnd type="none" w="sm" len="sm"/>
+                  </a:ln>
+                </p:spPr>
+                <p:txBody>
+                  <a:bodyPr wrap="none">
+                    <a:spAutoFit/>
+                  </a:bodyPr>
+                  <a:lstStyle/>
+                  <a:p>
+                    <a:pPr>
+                      <a:spcBef>
+                        <a:spcPct val="0"/>
+                      </a:spcBef>
+                    </a:pPr>
+                    <a:r>
+                      <a:rPr lang="en-US" sz="1500" b="1" i="1" dirty="0">
+                        <a:solidFill>
+                          <a:srgbClr val="800000"/>
+                        </a:solidFill>
+                      </a:rPr>
+                      <a:t>restriction</a:t>
+                    </a:r>
+                    <a:endParaRPr lang="en-US" sz="1500" dirty="0">
+                      <a:solidFill>
+                        <a:srgbClr val="800000"/>
+                      </a:solidFill>
+                    </a:endParaRPr>
+                  </a:p>
+                </p:txBody>
+              </p:sp>
+              <p:sp>
+                <p:nvSpPr>
+                  <p:cNvPr id="23" name="Text Box 31"/>
+                  <p:cNvSpPr txBox="1">
+                    <a:spLocks noChangeArrowheads="1"/>
+                  </p:cNvSpPr>
+                  <p:nvPr/>
+                </p:nvSpPr>
+                <p:spPr bwMode="auto">
+                  <a:xfrm>
+                    <a:off x="7308077" y="3850922"/>
+                    <a:ext cx="1408579" cy="553998"/>
+                  </a:xfrm>
+                  <a:prstGeom prst="rect">
+                    <a:avLst/>
+                  </a:prstGeom>
+                  <a:noFill/>
+                  <a:ln w="12700">
+                    <a:noFill/>
+                    <a:miter lim="800000"/>
+                    <a:headEnd type="none" w="sm" len="sm"/>
+                    <a:tailEnd type="none" w="sm" len="sm"/>
+                  </a:ln>
+                </p:spPr>
+                <p:txBody>
+                  <a:bodyPr wrap="square">
+                    <a:spAutoFit/>
+                  </a:bodyPr>
+                  <a:lstStyle/>
+                  <a:p>
+                    <a:pPr algn="r">
+                      <a:spcBef>
+                        <a:spcPct val="0"/>
+                      </a:spcBef>
+                    </a:pPr>
+                    <a:r>
+                      <a:rPr lang="en-US" sz="1500" b="1" i="1" dirty="0">
+                        <a:solidFill>
+                          <a:srgbClr val="800000"/>
+                        </a:solidFill>
+                      </a:rPr>
+                      <a:t>prolongation</a:t>
+                    </a:r>
+                  </a:p>
+                  <a:p>
+                    <a:pPr algn="r">
+                      <a:spcBef>
+                        <a:spcPct val="0"/>
+                      </a:spcBef>
+                    </a:pPr>
+                    <a:r>
+                      <a:rPr lang="en-US" sz="1500" i="1" dirty="0">
+                        <a:solidFill>
+                          <a:srgbClr val="800000"/>
+                        </a:solidFill>
+                      </a:rPr>
+                      <a:t>(interpolation)</a:t>
+                    </a:r>
+                    <a:endParaRPr lang="en-US" sz="1500" dirty="0">
+                      <a:solidFill>
+                        <a:srgbClr val="800000"/>
+                      </a:solidFill>
+                    </a:endParaRPr>
+                  </a:p>
+                </p:txBody>
+              </p:sp>
+              <p:sp>
+                <p:nvSpPr>
+                  <p:cNvPr id="24" name="Text Box 30"/>
+                  <p:cNvSpPr txBox="1">
+                    <a:spLocks noChangeArrowheads="1"/>
+                  </p:cNvSpPr>
+                  <p:nvPr/>
+                </p:nvSpPr>
+                <p:spPr bwMode="auto">
+                  <a:xfrm>
+                    <a:off x="6821501" y="2496415"/>
+                    <a:ext cx="1879432" cy="400110"/>
+                  </a:xfrm>
+                  <a:prstGeom prst="rect">
+                    <a:avLst/>
+                  </a:prstGeom>
+                  <a:solidFill>
+                    <a:schemeClr val="bg1"/>
+                  </a:solidFill>
+                  <a:ln w="12700">
+                    <a:noFill/>
+                    <a:miter lim="800000"/>
+                    <a:headEnd type="none" w="sm" len="sm"/>
+                    <a:tailEnd type="none" w="sm" len="sm"/>
+                  </a:ln>
+                </p:spPr>
+                <p:txBody>
+                  <a:bodyPr wrap="square">
+                    <a:spAutoFit/>
+                  </a:bodyPr>
+                  <a:lstStyle/>
+                  <a:p>
+                    <a:pPr>
+                      <a:spcBef>
+                        <a:spcPct val="0"/>
+                      </a:spcBef>
+                    </a:pPr>
+                    <a:r>
+                      <a:rPr lang="en-US" sz="2000" b="1" dirty="0">
+                        <a:solidFill>
+                          <a:srgbClr val="800000"/>
+                        </a:solidFill>
+                      </a:rPr>
+                      <a:t>Iteration 0</a:t>
+                    </a:r>
+                    <a:endParaRPr lang="en-US" sz="2000" dirty="0">
+                      <a:solidFill>
+                        <a:srgbClr val="800000"/>
+                      </a:solidFill>
+                    </a:endParaRPr>
+                  </a:p>
+                </p:txBody>
+              </p:sp>
+              <p:sp>
+                <p:nvSpPr>
+                  <p:cNvPr id="25" name="Rectangle 20"/>
+                  <p:cNvSpPr>
+                    <a:spLocks noChangeArrowheads="1"/>
+                  </p:cNvSpPr>
+                  <p:nvPr/>
+                </p:nvSpPr>
+                <p:spPr bwMode="auto">
+                  <a:xfrm>
+                    <a:off x="4445333" y="4319430"/>
+                    <a:ext cx="2726903" cy="323808"/>
+                  </a:xfrm>
+                  <a:prstGeom prst="rect">
+                    <a:avLst/>
+                  </a:prstGeom>
+                  <a:noFill/>
+                  <a:ln w="9525">
+                    <a:noFill/>
+                    <a:miter lim="800000"/>
+                    <a:headEnd/>
+                    <a:tailEnd/>
+                  </a:ln>
+                </p:spPr>
+                <p:txBody>
+                  <a:bodyPr wrap="square" lIns="92075" tIns="46038" rIns="92075" bIns="46038">
+                    <a:spAutoFit/>
+                  </a:bodyPr>
+                  <a:lstStyle/>
+                  <a:p>
+                    <a:pPr algn="ctr">
+                      <a:spcBef>
+                        <a:spcPct val="0"/>
+                      </a:spcBef>
+                    </a:pPr>
+                    <a:r>
+                      <a:rPr lang="en-US" sz="1500" b="1" i="1" dirty="0">
+                        <a:solidFill>
+                          <a:srgbClr val="800000"/>
+                        </a:solidFill>
+                      </a:rPr>
+                      <a:t>Relaxation on fine time grid</a:t>
+                    </a:r>
+                  </a:p>
+                </p:txBody>
+              </p:sp>
+              <p:sp>
+                <p:nvSpPr>
+                  <p:cNvPr id="26" name="Rectangle 19"/>
+                  <p:cNvSpPr>
+                    <a:spLocks noChangeArrowheads="1"/>
+                  </p:cNvSpPr>
+                  <p:nvPr/>
+                </p:nvSpPr>
+                <p:spPr bwMode="auto">
+                  <a:xfrm>
+                    <a:off x="4512410" y="2890074"/>
+                    <a:ext cx="2680419" cy="1719129"/>
+                  </a:xfrm>
+                  <a:prstGeom prst="rect">
+                    <a:avLst/>
+                  </a:prstGeom>
+                  <a:noFill/>
+                  <a:ln w="25400">
+                    <a:solidFill>
+                      <a:schemeClr val="tx1"/>
+                    </a:solidFill>
+                    <a:miter lim="800000"/>
+                    <a:headEnd/>
+                    <a:tailEnd/>
+                  </a:ln>
+                </p:spPr>
+                <p:txBody>
+                  <a:bodyPr wrap="none" anchor="ctr"/>
+                  <a:lstStyle/>
+                  <a:p>
+                    <a:endParaRPr lang="en-US" dirty="0"/>
+                  </a:p>
+                </p:txBody>
+              </p:sp>
+              <p:sp>
+                <p:nvSpPr>
+                  <p:cNvPr id="27" name="TextBox 26"/>
+                  <p:cNvSpPr txBox="1"/>
+                  <p:nvPr/>
+                </p:nvSpPr>
+                <p:spPr>
+                  <a:xfrm rot="16993905">
+                    <a:off x="4358674" y="3611949"/>
+                    <a:ext cx="571923" cy="323165"/>
+                  </a:xfrm>
+                  <a:prstGeom prst="rect">
+                    <a:avLst/>
+                  </a:prstGeom>
+                  <a:noFill/>
+                </p:spPr>
+                <p:txBody>
+                  <a:bodyPr wrap="none" rtlCol="0">
+                    <a:spAutoFit/>
+                  </a:bodyPr>
+                  <a:lstStyle/>
+                  <a:p>
+                    <a:r>
+                      <a:rPr lang="en-US" sz="1500" dirty="0">
+                        <a:solidFill>
+                          <a:srgbClr val="800000"/>
+                        </a:solidFill>
+                      </a:rPr>
+                      <a:t>Time</a:t>
+                    </a:r>
+                  </a:p>
+                </p:txBody>
+              </p:sp>
+              <p:sp>
+                <p:nvSpPr>
+                  <p:cNvPr id="28" name="TextBox 27"/>
+                  <p:cNvSpPr txBox="1"/>
+                  <p:nvPr/>
+                </p:nvSpPr>
+                <p:spPr>
+                  <a:xfrm rot="20878399">
+                    <a:off x="5545600" y="4003949"/>
+                    <a:ext cx="643306" cy="323165"/>
+                  </a:xfrm>
+                  <a:prstGeom prst="rect">
+                    <a:avLst/>
+                  </a:prstGeom>
+                  <a:noFill/>
+                </p:spPr>
+                <p:txBody>
+                  <a:bodyPr wrap="none" rtlCol="0">
+                    <a:spAutoFit/>
+                  </a:bodyPr>
+                  <a:lstStyle/>
+                  <a:p>
+                    <a:r>
+                      <a:rPr lang="en-US" sz="1500" dirty="0">
+                        <a:solidFill>
+                          <a:srgbClr val="800000"/>
+                        </a:solidFill>
+                      </a:rPr>
+                      <a:t>Space</a:t>
+                    </a:r>
+                  </a:p>
+                </p:txBody>
+              </p:sp>
+              <p:sp>
+                <p:nvSpPr>
+                  <p:cNvPr id="29" name="Line 25"/>
+                  <p:cNvSpPr>
+                    <a:spLocks noChangeShapeType="1"/>
+                  </p:cNvSpPr>
+                  <p:nvPr/>
+                </p:nvSpPr>
+                <p:spPr bwMode="auto">
+                  <a:xfrm flipV="1">
+                    <a:off x="4731429" y="3161590"/>
+                    <a:ext cx="122165" cy="407474"/>
+                  </a:xfrm>
+                  <a:prstGeom prst="line">
+                    <a:avLst/>
+                  </a:prstGeom>
+                  <a:noFill/>
+                  <a:ln w="28575">
+                    <a:solidFill>
+                      <a:srgbClr val="800000"/>
+                    </a:solidFill>
+                    <a:round/>
+                    <a:headEnd type="none" w="sm" len="sm"/>
+                    <a:tailEnd type="triangle" w="med" len="lg"/>
+                  </a:ln>
+                </p:spPr>
+                <p:txBody>
+                  <a:bodyPr wrap="none" anchor="ctr"/>
+                  <a:lstStyle/>
+                  <a:p>
+                    <a:endParaRPr lang="en-US" dirty="0"/>
+                  </a:p>
+                </p:txBody>
+              </p:sp>
+              <p:sp>
+                <p:nvSpPr>
+                  <p:cNvPr id="30" name="Line 25"/>
+                  <p:cNvSpPr>
+                    <a:spLocks noChangeShapeType="1"/>
+                  </p:cNvSpPr>
+                  <p:nvPr/>
+                </p:nvSpPr>
+                <p:spPr bwMode="auto">
+                  <a:xfrm flipV="1">
+                    <a:off x="6200795" y="3984102"/>
+                    <a:ext cx="515661" cy="145445"/>
+                  </a:xfrm>
+                  <a:prstGeom prst="line">
+                    <a:avLst/>
+                  </a:prstGeom>
+                  <a:noFill/>
+                  <a:ln w="28575">
+                    <a:solidFill>
+                      <a:srgbClr val="800000"/>
+                    </a:solidFill>
+                    <a:round/>
+                    <a:headEnd type="none" w="sm" len="sm"/>
+                    <a:tailEnd type="triangle" w="med" len="lg"/>
+                  </a:ln>
+                </p:spPr>
+                <p:txBody>
+                  <a:bodyPr wrap="none" anchor="ctr"/>
+                  <a:lstStyle/>
+                  <a:p>
+                    <a:endParaRPr lang="en-US" dirty="0"/>
+                  </a:p>
+                </p:txBody>
+              </p:sp>
+              <p:grpSp>
+                <p:nvGrpSpPr>
+                  <p:cNvPr id="31" name="Group 30"/>
+                  <p:cNvGrpSpPr/>
+                  <p:nvPr/>
+                </p:nvGrpSpPr>
+                <p:grpSpPr>
+                  <a:xfrm>
+                    <a:off x="5840012" y="4965290"/>
+                    <a:ext cx="1534179" cy="1030478"/>
+                    <a:chOff x="5454918" y="5153742"/>
+                    <a:chExt cx="1534179" cy="1030478"/>
+                  </a:xfrm>
+                </p:grpSpPr>
+                <p:sp>
+                  <p:nvSpPr>
+                    <p:cNvPr id="32" name="Rectangle 20"/>
+                    <p:cNvSpPr>
+                      <a:spLocks noChangeArrowheads="1"/>
+                    </p:cNvSpPr>
+                    <p:nvPr/>
+                  </p:nvSpPr>
+                  <p:spPr bwMode="auto">
+                    <a:xfrm>
+                      <a:off x="5454918" y="5629580"/>
+                      <a:ext cx="1525985" cy="554640"/>
+                    </a:xfrm>
+                    <a:prstGeom prst="rect">
+                      <a:avLst/>
+                    </a:prstGeom>
+                    <a:noFill/>
+                    <a:ln w="9525">
+                      <a:noFill/>
+                      <a:miter lim="800000"/>
+                      <a:headEnd/>
+                      <a:tailEnd/>
+                    </a:ln>
+                  </p:spPr>
+                  <p:txBody>
+                    <a:bodyPr wrap="square" lIns="92075" tIns="46038" rIns="92075" bIns="46038">
+                      <a:spAutoFit/>
+                    </a:bodyPr>
+                    <a:lstStyle/>
+                    <a:p>
+                      <a:pPr algn="ctr">
+                        <a:spcBef>
+                          <a:spcPct val="0"/>
+                        </a:spcBef>
+                      </a:pPr>
+                      <a:r>
+                        <a:rPr lang="en-US" sz="1500" b="1" i="1" dirty="0">
+                          <a:solidFill>
+                            <a:srgbClr val="800000"/>
+                          </a:solidFill>
+                        </a:rPr>
+                        <a:t>Relaxation on first coarse grid</a:t>
+                      </a:r>
+                    </a:p>
+                  </p:txBody>
+                </p:sp>
+                <p:sp>
+                  <p:nvSpPr>
+                    <p:cNvPr id="33" name="Rectangle 19"/>
+                    <p:cNvSpPr>
+                      <a:spLocks noChangeArrowheads="1"/>
+                    </p:cNvSpPr>
+                    <p:nvPr/>
+                  </p:nvSpPr>
+                  <p:spPr bwMode="auto">
+                    <a:xfrm>
+                      <a:off x="5489677" y="5153742"/>
+                      <a:ext cx="1499420" cy="983215"/>
+                    </a:xfrm>
+                    <a:prstGeom prst="rect">
+                      <a:avLst/>
+                    </a:prstGeom>
+                    <a:noFill/>
+                    <a:ln w="25400">
+                      <a:solidFill>
+                        <a:schemeClr val="tx1"/>
+                      </a:solidFill>
+                      <a:miter lim="800000"/>
+                      <a:headEnd/>
+                      <a:tailEnd/>
+                    </a:ln>
+                  </p:spPr>
+                  <p:txBody>
+                    <a:bodyPr wrap="none" anchor="ctr"/>
+                    <a:lstStyle/>
+                    <a:p>
+                      <a:endParaRPr lang="en-US" dirty="0"/>
+                    </a:p>
+                  </p:txBody>
+                </p:sp>
+              </p:grpSp>
+            </p:grpSp>
+            <p:sp>
+              <p:nvSpPr>
+                <p:cNvPr id="11" name="Left Brace 10"/>
+                <p:cNvSpPr/>
+                <p:nvPr/>
+              </p:nvSpPr>
+              <p:spPr>
+                <a:xfrm>
+                  <a:off x="5538839" y="4875161"/>
+                  <a:ext cx="213027" cy="991420"/>
+                </a:xfrm>
+                <a:prstGeom prst="leftBrace">
+                  <a:avLst/>
+                </a:prstGeom>
+                <a:ln w="31750" cmpd="sng">
+                  <a:solidFill>
+                    <a:srgbClr val="800000"/>
+                  </a:solidFill>
+                </a:ln>
+                <a:effectLst/>
+              </p:spPr>
+              <p:style>
+                <a:lnRef idx="2">
+                  <a:schemeClr val="accent1"/>
+                </a:lnRef>
+                <a:fillRef idx="0">
+                  <a:schemeClr val="accent1"/>
+                </a:fillRef>
+                <a:effectRef idx="1">
+                  <a:schemeClr val="accent1"/>
+                </a:effectRef>
+                <a:fontRef idx="minor">
+                  <a:schemeClr val="tx1"/>
+                </a:fontRef>
+              </p:style>
+              <p:txBody>
+                <a:bodyPr rtlCol="0" anchor="ctr"/>
+                <a:lstStyle/>
+                <a:p>
+                  <a:pPr algn="ctr"/>
+                  <a:endParaRPr lang="en-US" dirty="0">
+                    <a:solidFill>
+                      <a:srgbClr val="800000"/>
+                    </a:solidFill>
+                  </a:endParaRPr>
+                </a:p>
+              </p:txBody>
+            </p:sp>
+            <p:sp>
+              <p:nvSpPr>
+                <p:cNvPr id="12" name="Rectangle 20"/>
+                <p:cNvSpPr>
+                  <a:spLocks noChangeArrowheads="1"/>
+                </p:cNvSpPr>
+                <p:nvPr/>
+              </p:nvSpPr>
+              <p:spPr bwMode="auto">
+                <a:xfrm>
+                  <a:off x="4439044" y="4849797"/>
+                  <a:ext cx="1171678" cy="1016305"/>
+                </a:xfrm>
+                <a:prstGeom prst="rect">
+                  <a:avLst/>
+                </a:prstGeom>
+                <a:noFill/>
+                <a:ln w="9525">
+                  <a:noFill/>
+                  <a:miter lim="800000"/>
+                  <a:headEnd/>
+                  <a:tailEnd/>
+                </a:ln>
+              </p:spPr>
+              <p:txBody>
+                <a:bodyPr wrap="square" lIns="92075" tIns="46038" rIns="92075" bIns="46038">
+                  <a:spAutoFit/>
+                </a:bodyPr>
+                <a:lstStyle/>
+                <a:p>
+                  <a:pPr>
+                    <a:spcBef>
+                      <a:spcPct val="0"/>
+                    </a:spcBef>
+                  </a:pPr>
+                  <a:r>
+                    <a:rPr lang="en-US" sz="1500" b="1" i="1" dirty="0">
+                      <a:solidFill>
+                        <a:srgbClr val="800000"/>
+                      </a:solidFill>
+                    </a:rPr>
+                    <a:t>Note: smaller grid</a:t>
+                  </a:r>
+                </a:p>
+                <a:p>
+                  <a:pPr>
+                    <a:spcBef>
+                      <a:spcPct val="0"/>
+                    </a:spcBef>
+                  </a:pPr>
+                  <a:r>
+                    <a:rPr lang="en-US" sz="1500" b="1" i="1" dirty="0">
+                      <a:solidFill>
+                        <a:srgbClr val="800000"/>
+                      </a:solidFill>
+                    </a:rPr>
+                    <a:t>with fewer time values</a:t>
+                  </a:r>
+                </a:p>
+              </p:txBody>
+            </p:sp>
+          </p:grpSp>
+          <p:pic>
+            <p:nvPicPr>
+              <p:cNvPr id="9" name="Picture 8" descr="latex-image-1.pdf"/>
+              <p:cNvPicPr>
+                <a:picLocks noChangeAspect="1"/>
+              </p:cNvPicPr>
+              <p:nvPr/>
+            </p:nvPicPr>
+            <p:blipFill>
+              <a:blip r:embed="rId3">
+                <a:extLst>
+                  <a:ext uri="{28A0092B-C50C-407E-A947-70E740481C1C}">
+                    <a14:useLocalDpi xmlns:a14="http://schemas.microsoft.com/office/drawing/2010/main" val="0"/>
+                  </a:ext>
+                </a:extLst>
+              </a:blip>
+              <a:stretch>
+                <a:fillRect/>
+              </a:stretch>
+            </p:blipFill>
+            <p:spPr>
+              <a:xfrm>
+                <a:off x="5290705" y="3144982"/>
+                <a:ext cx="1079500" cy="152400"/>
+              </a:xfrm>
+              <a:prstGeom prst="rect">
+                <a:avLst/>
+              </a:prstGeom>
+            </p:spPr>
+          </p:pic>
+        </p:grpSp>
+      </p:grpSp>
+      <p:grpSp>
+        <p:nvGrpSpPr>
+          <p:cNvPr id="38" name="Group 37"/>
+          <p:cNvGrpSpPr/>
+          <p:nvPr/>
+        </p:nvGrpSpPr>
+        <p:grpSpPr>
+          <a:xfrm>
+            <a:off x="5054066" y="2062708"/>
+            <a:ext cx="4571129" cy="3590432"/>
+            <a:chOff x="4507298" y="2496415"/>
+            <a:chExt cx="4571129" cy="3590432"/>
+          </a:xfrm>
+        </p:grpSpPr>
+        <p:sp>
+          <p:nvSpPr>
+            <p:cNvPr id="41" name="Freeform 6"/>
+            <p:cNvSpPr>
+              <a:spLocks/>
+            </p:cNvSpPr>
+            <p:nvPr/>
+          </p:nvSpPr>
+          <p:spPr bwMode="auto">
+            <a:xfrm>
+              <a:off x="6187733" y="4005521"/>
+              <a:ext cx="13187" cy="13373"/>
+            </a:xfrm>
+            <a:custGeom>
+              <a:avLst/>
+              <a:gdLst>
+                <a:gd name="T0" fmla="*/ 0 w 17"/>
+                <a:gd name="T1" fmla="*/ 0 h 17"/>
+                <a:gd name="T2" fmla="*/ 2147483647 w 17"/>
+                <a:gd name="T3" fmla="*/ 0 h 17"/>
+                <a:gd name="T4" fmla="*/ 2147483647 w 17"/>
+                <a:gd name="T5" fmla="*/ 2147483647 h 17"/>
+                <a:gd name="T6" fmla="*/ 0 w 17"/>
+                <a:gd name="T7" fmla="*/ 2147483647 h 17"/>
+                <a:gd name="T8" fmla="*/ 0 w 17"/>
+                <a:gd name="T9" fmla="*/ 0 h 17"/>
+                <a:gd name="T10" fmla="*/ 0 60000 65536"/>
+                <a:gd name="T11" fmla="*/ 0 60000 65536"/>
+                <a:gd name="T12" fmla="*/ 0 60000 65536"/>
+                <a:gd name="T13" fmla="*/ 0 60000 65536"/>
+                <a:gd name="T14" fmla="*/ 0 60000 65536"/>
+                <a:gd name="T15" fmla="*/ 0 w 17"/>
+                <a:gd name="T16" fmla="*/ 0 h 17"/>
+                <a:gd name="T17" fmla="*/ 17 w 17"/>
+                <a:gd name="T18" fmla="*/ 17 h 17"/>
+              </a:gdLst>
+              <a:ahLst/>
+              <a:cxnLst>
+                <a:cxn ang="T10">
+                  <a:pos x="T0" y="T1"/>
+                </a:cxn>
+                <a:cxn ang="T11">
+                  <a:pos x="T2" y="T3"/>
+                </a:cxn>
+                <a:cxn ang="T12">
+                  <a:pos x="T4" y="T5"/>
+                </a:cxn>
+                <a:cxn ang="T13">
+                  <a:pos x="T6" y="T7"/>
+                </a:cxn>
+                <a:cxn ang="T14">
+                  <a:pos x="T8" y="T9"/>
+                </a:cxn>
+              </a:cxnLst>
+              <a:rect l="T15" t="T16" r="T17" b="T18"/>
+              <a:pathLst>
+                <a:path w="17" h="17">
+                  <a:moveTo>
+                    <a:pt x="0" y="0"/>
+                  </a:moveTo>
+                  <a:lnTo>
+                    <a:pt x="16" y="0"/>
+                  </a:lnTo>
+                  <a:lnTo>
+                    <a:pt x="16" y="16"/>
+                  </a:lnTo>
+                  <a:lnTo>
+                    <a:pt x="0" y="16"/>
+                  </a:lnTo>
+                  <a:lnTo>
+                    <a:pt x="0" y="0"/>
+                  </a:lnTo>
+                </a:path>
+              </a:pathLst>
+            </a:custGeom>
+            <a:solidFill>
+              <a:srgbClr val="FFFFFF"/>
+            </a:solidFill>
+            <a:ln w="9525" cap="rnd">
+              <a:noFill/>
+              <a:round/>
+              <a:headEnd type="none" w="sm" len="sm"/>
+              <a:tailEnd type="none" w="sm" len="sm"/>
+            </a:ln>
+          </p:spPr>
+          <p:txBody>
+            <a:bodyPr/>
+            <a:lstStyle/>
+            <a:p>
+              <a:endParaRPr lang="en-US" dirty="0"/>
+            </a:p>
+          </p:txBody>
+        </p:sp>
+        <p:sp>
+          <p:nvSpPr>
+            <p:cNvPr id="42" name="Freeform 17"/>
+            <p:cNvSpPr>
+              <a:spLocks/>
+            </p:cNvSpPr>
+            <p:nvPr/>
+          </p:nvSpPr>
+          <p:spPr bwMode="auto">
+            <a:xfrm>
+              <a:off x="6034204" y="5202354"/>
+              <a:ext cx="12245" cy="13373"/>
+            </a:xfrm>
+            <a:custGeom>
+              <a:avLst/>
+              <a:gdLst>
+                <a:gd name="T0" fmla="*/ 0 w 17"/>
+                <a:gd name="T1" fmla="*/ 0 h 17"/>
+                <a:gd name="T2" fmla="*/ 2147483647 w 17"/>
+                <a:gd name="T3" fmla="*/ 0 h 17"/>
+                <a:gd name="T4" fmla="*/ 2147483647 w 17"/>
+                <a:gd name="T5" fmla="*/ 2147483647 h 17"/>
+                <a:gd name="T6" fmla="*/ 0 w 17"/>
+                <a:gd name="T7" fmla="*/ 2147483647 h 17"/>
+                <a:gd name="T8" fmla="*/ 0 w 17"/>
+                <a:gd name="T9" fmla="*/ 0 h 17"/>
+                <a:gd name="T10" fmla="*/ 0 60000 65536"/>
+                <a:gd name="T11" fmla="*/ 0 60000 65536"/>
+                <a:gd name="T12" fmla="*/ 0 60000 65536"/>
+                <a:gd name="T13" fmla="*/ 0 60000 65536"/>
+                <a:gd name="T14" fmla="*/ 0 60000 65536"/>
+                <a:gd name="T15" fmla="*/ 0 w 17"/>
+                <a:gd name="T16" fmla="*/ 0 h 17"/>
+                <a:gd name="T17" fmla="*/ 17 w 17"/>
+                <a:gd name="T18" fmla="*/ 17 h 17"/>
+              </a:gdLst>
+              <a:ahLst/>
+              <a:cxnLst>
+                <a:cxn ang="T10">
+                  <a:pos x="T0" y="T1"/>
+                </a:cxn>
+                <a:cxn ang="T11">
+                  <a:pos x="T2" y="T3"/>
+                </a:cxn>
+                <a:cxn ang="T12">
+                  <a:pos x="T4" y="T5"/>
+                </a:cxn>
+                <a:cxn ang="T13">
+                  <a:pos x="T6" y="T7"/>
+                </a:cxn>
+                <a:cxn ang="T14">
+                  <a:pos x="T8" y="T9"/>
+                </a:cxn>
+              </a:cxnLst>
+              <a:rect l="T15" t="T16" r="T17" b="T18"/>
+              <a:pathLst>
+                <a:path w="17" h="17">
+                  <a:moveTo>
+                    <a:pt x="0" y="0"/>
+                  </a:moveTo>
+                  <a:lnTo>
+                    <a:pt x="16" y="0"/>
+                  </a:lnTo>
+                  <a:lnTo>
+                    <a:pt x="16" y="16"/>
+                  </a:lnTo>
+                  <a:lnTo>
+                    <a:pt x="0" y="16"/>
+                  </a:lnTo>
+                  <a:lnTo>
+                    <a:pt x="0" y="0"/>
+                  </a:lnTo>
+                </a:path>
+              </a:pathLst>
+            </a:custGeom>
+            <a:solidFill>
+              <a:srgbClr val="FFFFFF"/>
+            </a:solidFill>
+            <a:ln w="9525" cap="rnd">
+              <a:noFill/>
+              <a:round/>
+              <a:headEnd type="none" w="sm" len="sm"/>
+              <a:tailEnd type="none" w="sm" len="sm"/>
+            </a:ln>
+          </p:spPr>
+          <p:txBody>
+            <a:bodyPr/>
+            <a:lstStyle/>
+            <a:p>
+              <a:endParaRPr lang="en-US" dirty="0"/>
+            </a:p>
+          </p:txBody>
+        </p:sp>
+        <p:sp>
+          <p:nvSpPr>
+            <p:cNvPr id="43" name="Rectangle 23"/>
+            <p:cNvSpPr>
+              <a:spLocks noChangeArrowheads="1"/>
+            </p:cNvSpPr>
+            <p:nvPr/>
+          </p:nvSpPr>
+          <p:spPr bwMode="auto">
+            <a:xfrm>
+              <a:off x="8854255" y="3585244"/>
+              <a:ext cx="224172" cy="146142"/>
+            </a:xfrm>
+            <a:prstGeom prst="rect">
+              <a:avLst/>
+            </a:prstGeom>
+            <a:noFill/>
+            <a:ln w="25400">
+              <a:solidFill>
+                <a:schemeClr val="tx1"/>
+              </a:solidFill>
+              <a:miter lim="800000"/>
+              <a:headEnd/>
+              <a:tailEnd/>
+            </a:ln>
+          </p:spPr>
+          <p:txBody>
+            <a:bodyPr wrap="none" anchor="ctr"/>
+            <a:lstStyle/>
+            <a:p>
+              <a:endParaRPr lang="en-US" dirty="0"/>
+            </a:p>
+          </p:txBody>
+        </p:sp>
+        <p:sp>
+          <p:nvSpPr>
+            <p:cNvPr id="44" name="Line 25"/>
+            <p:cNvSpPr>
+              <a:spLocks noChangeShapeType="1"/>
+            </p:cNvSpPr>
+            <p:nvPr/>
+          </p:nvSpPr>
+          <p:spPr bwMode="auto">
+            <a:xfrm flipV="1">
+              <a:off x="8282521" y="3738074"/>
+              <a:ext cx="634841" cy="1225488"/>
+            </a:xfrm>
+            <a:prstGeom prst="line">
+              <a:avLst/>
+            </a:prstGeom>
+            <a:noFill/>
+            <a:ln w="25400">
+              <a:solidFill>
+                <a:schemeClr val="tx1"/>
+              </a:solidFill>
+              <a:round/>
+              <a:headEnd type="none" w="sm" len="sm"/>
+              <a:tailEnd type="stealth" w="med" len="lg"/>
+            </a:ln>
+          </p:spPr>
+          <p:txBody>
+            <a:bodyPr wrap="none" anchor="ctr"/>
+            <a:lstStyle/>
+            <a:p>
+              <a:endParaRPr lang="en-US" dirty="0"/>
+            </a:p>
+          </p:txBody>
+        </p:sp>
+        <p:sp>
+          <p:nvSpPr>
+            <p:cNvPr id="45" name="Line 26"/>
+            <p:cNvSpPr>
+              <a:spLocks noChangeShapeType="1"/>
+            </p:cNvSpPr>
+            <p:nvPr/>
+          </p:nvSpPr>
+          <p:spPr bwMode="auto">
+            <a:xfrm>
+              <a:off x="7396192" y="5236740"/>
+              <a:ext cx="390889" cy="699187"/>
+            </a:xfrm>
+            <a:prstGeom prst="line">
+              <a:avLst/>
+            </a:prstGeom>
+            <a:noFill/>
+            <a:ln w="25400">
+              <a:solidFill>
+                <a:schemeClr val="tx1"/>
+              </a:solidFill>
+              <a:prstDash val="dash"/>
+              <a:round/>
+              <a:headEnd type="none" w="sm" len="sm"/>
+              <a:tailEnd type="stealth" w="med" len="lg"/>
+            </a:ln>
+          </p:spPr>
+          <p:txBody>
+            <a:bodyPr wrap="none" anchor="ctr"/>
+            <a:lstStyle/>
+            <a:p>
+              <a:endParaRPr lang="en-US" dirty="0"/>
+            </a:p>
+          </p:txBody>
+        </p:sp>
+        <p:sp>
+          <p:nvSpPr>
+            <p:cNvPr id="46" name="Line 27"/>
+            <p:cNvSpPr>
+              <a:spLocks noChangeShapeType="1"/>
+            </p:cNvSpPr>
+            <p:nvPr/>
+          </p:nvSpPr>
+          <p:spPr bwMode="auto">
+            <a:xfrm flipV="1">
+              <a:off x="7794616" y="5114478"/>
+              <a:ext cx="413494" cy="818585"/>
+            </a:xfrm>
+            <a:prstGeom prst="line">
+              <a:avLst/>
+            </a:prstGeom>
+            <a:noFill/>
+            <a:ln w="25400">
+              <a:solidFill>
+                <a:schemeClr val="tx1"/>
+              </a:solidFill>
+              <a:prstDash val="dash"/>
+              <a:round/>
+              <a:headEnd type="none" w="sm" len="sm"/>
+              <a:tailEnd type="stealth" w="med" len="lg"/>
+            </a:ln>
+          </p:spPr>
+          <p:txBody>
+            <a:bodyPr wrap="none" anchor="ctr"/>
+            <a:lstStyle/>
+            <a:p>
+              <a:endParaRPr lang="en-US" dirty="0"/>
+            </a:p>
+          </p:txBody>
+        </p:sp>
+        <p:sp>
+          <p:nvSpPr>
+            <p:cNvPr id="47" name="Rectangle 28"/>
+            <p:cNvSpPr>
+              <a:spLocks noChangeArrowheads="1"/>
+            </p:cNvSpPr>
+            <p:nvPr/>
+          </p:nvSpPr>
+          <p:spPr bwMode="auto">
+            <a:xfrm>
+              <a:off x="8163842" y="4964517"/>
+              <a:ext cx="224172" cy="145187"/>
+            </a:xfrm>
+            <a:prstGeom prst="rect">
+              <a:avLst/>
+            </a:prstGeom>
+            <a:noFill/>
+            <a:ln w="25400">
+              <a:solidFill>
+                <a:schemeClr val="tx1"/>
+              </a:solidFill>
+              <a:miter lim="800000"/>
+              <a:headEnd/>
+              <a:tailEnd/>
+            </a:ln>
+          </p:spPr>
+          <p:txBody>
+            <a:bodyPr wrap="none" anchor="ctr"/>
+            <a:lstStyle/>
+            <a:p>
+              <a:endParaRPr lang="en-US" dirty="0"/>
+            </a:p>
+          </p:txBody>
+        </p:sp>
+        <p:sp>
+          <p:nvSpPr>
+            <p:cNvPr id="48" name="Rectangle 29"/>
+            <p:cNvSpPr>
+              <a:spLocks noChangeArrowheads="1"/>
+            </p:cNvSpPr>
+            <p:nvPr/>
+          </p:nvSpPr>
+          <p:spPr bwMode="auto">
+            <a:xfrm>
+              <a:off x="7687239" y="5940705"/>
+              <a:ext cx="224172" cy="146142"/>
+            </a:xfrm>
+            <a:prstGeom prst="rect">
+              <a:avLst/>
+            </a:prstGeom>
+            <a:noFill/>
+            <a:ln w="25400">
+              <a:solidFill>
+                <a:schemeClr val="tx1"/>
+              </a:solidFill>
+              <a:miter lim="800000"/>
+              <a:headEnd/>
+              <a:tailEnd/>
+            </a:ln>
+          </p:spPr>
+          <p:txBody>
+            <a:bodyPr wrap="none" anchor="ctr"/>
+            <a:lstStyle/>
+            <a:p>
+              <a:endParaRPr lang="en-US" dirty="0"/>
+            </a:p>
+          </p:txBody>
+        </p:sp>
+        <p:sp>
+          <p:nvSpPr>
+            <p:cNvPr id="49" name="Line 24"/>
+            <p:cNvSpPr>
+              <a:spLocks noChangeShapeType="1"/>
+            </p:cNvSpPr>
+            <p:nvPr/>
+          </p:nvSpPr>
+          <p:spPr bwMode="auto">
+            <a:xfrm>
+              <a:off x="7045805" y="4602505"/>
+              <a:ext cx="198741" cy="358190"/>
+            </a:xfrm>
+            <a:prstGeom prst="line">
+              <a:avLst/>
+            </a:prstGeom>
+            <a:noFill/>
+            <a:ln w="25400">
+              <a:solidFill>
+                <a:schemeClr val="tx1"/>
+              </a:solidFill>
+              <a:round/>
+              <a:headEnd type="none" w="sm" len="sm"/>
+              <a:tailEnd type="stealth" w="med" len="lg"/>
+            </a:ln>
+          </p:spPr>
+          <p:txBody>
+            <a:bodyPr wrap="none" anchor="ctr"/>
+            <a:lstStyle/>
+            <a:p>
+              <a:endParaRPr lang="en-US" dirty="0"/>
+            </a:p>
+          </p:txBody>
+        </p:sp>
+        <p:sp>
+          <p:nvSpPr>
+            <p:cNvPr id="52" name="Text Box 30"/>
+            <p:cNvSpPr txBox="1">
+              <a:spLocks noChangeArrowheads="1"/>
+            </p:cNvSpPr>
+            <p:nvPr/>
+          </p:nvSpPr>
+          <p:spPr bwMode="auto">
+            <a:xfrm>
+              <a:off x="6821501" y="2496415"/>
+              <a:ext cx="1879432" cy="400110"/>
+            </a:xfrm>
+            <a:prstGeom prst="rect">
+              <a:avLst/>
+            </a:prstGeom>
+            <a:solidFill>
+              <a:schemeClr val="bg1"/>
+            </a:solidFill>
+            <a:ln w="12700">
+              <a:noFill/>
+              <a:miter lim="800000"/>
+              <a:headEnd type="none" w="sm" len="sm"/>
+              <a:tailEnd type="none" w="sm" len="sm"/>
+            </a:ln>
+          </p:spPr>
+          <p:txBody>
+            <a:bodyPr wrap="square">
+              <a:spAutoFit/>
+            </a:bodyPr>
+            <a:lstStyle/>
+            <a:p>
+              <a:pPr>
+                <a:spcBef>
+                  <a:spcPct val="0"/>
+                </a:spcBef>
+              </a:pPr>
+              <a:r>
+                <a:rPr lang="en-US" sz="2000" b="1" dirty="0">
+                  <a:solidFill>
+                    <a:srgbClr val="800000"/>
+                  </a:solidFill>
+                </a:rPr>
+                <a:t>Iteration 1</a:t>
+              </a:r>
+              <a:endParaRPr lang="en-US" sz="2000" dirty="0">
+                <a:solidFill>
+                  <a:srgbClr val="800000"/>
+                </a:solidFill>
+              </a:endParaRPr>
+            </a:p>
+          </p:txBody>
+        </p:sp>
+        <p:pic>
+          <p:nvPicPr>
+            <p:cNvPr id="53" name="Picture 52"/>
+            <p:cNvPicPr>
+              <a:picLocks noChangeAspect="1"/>
+            </p:cNvPicPr>
+            <p:nvPr/>
+          </p:nvPicPr>
+          <p:blipFill rotWithShape="1">
+            <a:blip r:embed="rId4">
+              <a:extLst>
+                <a:ext uri="{28A0092B-C50C-407E-A947-70E740481C1C}">
+                  <a14:useLocalDpi xmlns:a14="http://schemas.microsoft.com/office/drawing/2010/main" val="0"/>
+                </a:ext>
+              </a:extLst>
+            </a:blip>
+            <a:srcRect t="25450" b="9267"/>
+            <a:stretch/>
+          </p:blipFill>
+          <p:spPr>
+            <a:xfrm>
+              <a:off x="4699061" y="3160919"/>
+              <a:ext cx="2515412" cy="1156199"/>
+            </a:xfrm>
+            <a:prstGeom prst="rect">
+              <a:avLst/>
+            </a:prstGeom>
+          </p:spPr>
+        </p:pic>
+        <p:sp>
+          <p:nvSpPr>
+            <p:cNvPr id="55" name="Rectangle 19"/>
+            <p:cNvSpPr>
+              <a:spLocks noChangeArrowheads="1"/>
+            </p:cNvSpPr>
+            <p:nvPr/>
+          </p:nvSpPr>
+          <p:spPr bwMode="auto">
+            <a:xfrm>
+              <a:off x="4512410" y="2890074"/>
+              <a:ext cx="2680419" cy="1719129"/>
+            </a:xfrm>
+            <a:prstGeom prst="rect">
+              <a:avLst/>
+            </a:prstGeom>
+            <a:noFill/>
+            <a:ln w="25400">
+              <a:solidFill>
+                <a:schemeClr val="tx1"/>
+              </a:solidFill>
+              <a:miter lim="800000"/>
+              <a:headEnd/>
+              <a:tailEnd/>
+            </a:ln>
+          </p:spPr>
+          <p:txBody>
+            <a:bodyPr wrap="none" anchor="ctr"/>
+            <a:lstStyle/>
+            <a:p>
+              <a:endParaRPr lang="en-US" dirty="0"/>
+            </a:p>
+          </p:txBody>
+        </p:sp>
+        <p:sp>
+          <p:nvSpPr>
+            <p:cNvPr id="56" name="TextBox 55"/>
+            <p:cNvSpPr txBox="1"/>
+            <p:nvPr/>
+          </p:nvSpPr>
+          <p:spPr>
+            <a:xfrm rot="16993905">
+              <a:off x="4382919" y="3919046"/>
+              <a:ext cx="571923" cy="323165"/>
+            </a:xfrm>
+            <a:prstGeom prst="rect">
+              <a:avLst/>
+            </a:prstGeom>
+            <a:noFill/>
+          </p:spPr>
+          <p:txBody>
+            <a:bodyPr wrap="none" rtlCol="0">
+              <a:spAutoFit/>
+            </a:bodyPr>
+            <a:lstStyle/>
+            <a:p>
+              <a:r>
+                <a:rPr lang="en-US" sz="1500" dirty="0">
+                  <a:solidFill>
+                    <a:srgbClr val="800000"/>
+                  </a:solidFill>
+                </a:rPr>
+                <a:t>Time</a:t>
+              </a:r>
+            </a:p>
+          </p:txBody>
+        </p:sp>
+        <p:sp>
+          <p:nvSpPr>
+            <p:cNvPr id="57" name="TextBox 56"/>
+            <p:cNvSpPr txBox="1"/>
+            <p:nvPr/>
+          </p:nvSpPr>
+          <p:spPr>
+            <a:xfrm rot="20878399">
+              <a:off x="5545600" y="4003949"/>
+              <a:ext cx="643306" cy="323165"/>
+            </a:xfrm>
+            <a:prstGeom prst="rect">
+              <a:avLst/>
+            </a:prstGeom>
+            <a:noFill/>
+          </p:spPr>
+          <p:txBody>
+            <a:bodyPr wrap="none" rtlCol="0">
+              <a:spAutoFit/>
+            </a:bodyPr>
+            <a:lstStyle/>
+            <a:p>
+              <a:r>
+                <a:rPr lang="en-US" sz="1500" dirty="0">
+                  <a:solidFill>
+                    <a:srgbClr val="800000"/>
+                  </a:solidFill>
+                </a:rPr>
+                <a:t>Space</a:t>
+              </a:r>
+            </a:p>
+          </p:txBody>
+        </p:sp>
+        <p:sp>
+          <p:nvSpPr>
+            <p:cNvPr id="58" name="Line 25"/>
+            <p:cNvSpPr>
+              <a:spLocks noChangeShapeType="1"/>
+            </p:cNvSpPr>
+            <p:nvPr/>
+          </p:nvSpPr>
+          <p:spPr bwMode="auto">
+            <a:xfrm flipV="1">
+              <a:off x="4766064" y="3461760"/>
+              <a:ext cx="122165" cy="407474"/>
+            </a:xfrm>
+            <a:prstGeom prst="line">
+              <a:avLst/>
+            </a:prstGeom>
+            <a:noFill/>
+            <a:ln w="28575">
+              <a:solidFill>
+                <a:srgbClr val="800000"/>
+              </a:solidFill>
+              <a:round/>
+              <a:headEnd type="none" w="sm" len="sm"/>
+              <a:tailEnd type="triangle" w="med" len="lg"/>
+            </a:ln>
+          </p:spPr>
+          <p:txBody>
+            <a:bodyPr wrap="none" anchor="ctr"/>
+            <a:lstStyle/>
+            <a:p>
+              <a:endParaRPr lang="en-US" dirty="0"/>
+            </a:p>
+          </p:txBody>
+        </p:sp>
+        <p:sp>
+          <p:nvSpPr>
+            <p:cNvPr id="59" name="Line 25"/>
+            <p:cNvSpPr>
+              <a:spLocks noChangeShapeType="1"/>
+            </p:cNvSpPr>
+            <p:nvPr/>
+          </p:nvSpPr>
+          <p:spPr bwMode="auto">
+            <a:xfrm flipV="1">
+              <a:off x="6200795" y="3984102"/>
+              <a:ext cx="515661" cy="145445"/>
+            </a:xfrm>
+            <a:prstGeom prst="line">
+              <a:avLst/>
+            </a:prstGeom>
+            <a:noFill/>
+            <a:ln w="28575">
+              <a:solidFill>
+                <a:srgbClr val="800000"/>
+              </a:solidFill>
+              <a:round/>
+              <a:headEnd type="none" w="sm" len="sm"/>
+              <a:tailEnd type="triangle" w="med" len="lg"/>
+            </a:ln>
+          </p:spPr>
+          <p:txBody>
+            <a:bodyPr wrap="none" anchor="ctr"/>
+            <a:lstStyle/>
+            <a:p>
+              <a:endParaRPr lang="en-US" dirty="0"/>
+            </a:p>
+          </p:txBody>
+        </p:sp>
+        <p:grpSp>
+          <p:nvGrpSpPr>
+            <p:cNvPr id="60" name="Group 59"/>
+            <p:cNvGrpSpPr/>
+            <p:nvPr/>
+          </p:nvGrpSpPr>
+          <p:grpSpPr>
+            <a:xfrm>
+              <a:off x="5874771" y="4965290"/>
+              <a:ext cx="1499420" cy="983215"/>
+              <a:chOff x="5489677" y="5153742"/>
+              <a:chExt cx="1499420" cy="983215"/>
+            </a:xfrm>
+          </p:grpSpPr>
+          <p:pic>
+            <p:nvPicPr>
+              <p:cNvPr id="61" name="Picture 60"/>
+              <p:cNvPicPr>
+                <a:picLocks noChangeAspect="1"/>
+              </p:cNvPicPr>
+              <p:nvPr/>
+            </p:nvPicPr>
+            <p:blipFill rotWithShape="1">
+              <a:blip r:embed="rId4">
+                <a:extLst>
+                  <a:ext uri="{28A0092B-C50C-407E-A947-70E740481C1C}">
+                    <a14:useLocalDpi xmlns:a14="http://schemas.microsoft.com/office/drawing/2010/main" val="0"/>
+                  </a:ext>
+                </a:extLst>
+              </a:blip>
+              <a:srcRect t="25450" b="9267"/>
+              <a:stretch/>
+            </p:blipFill>
+            <p:spPr>
+              <a:xfrm>
+                <a:off x="5510745" y="5161934"/>
+                <a:ext cx="1453577" cy="668131"/>
+              </a:xfrm>
+              <a:prstGeom prst="rect">
+                <a:avLst/>
+              </a:prstGeom>
+            </p:spPr>
+          </p:pic>
+          <p:sp>
+            <p:nvSpPr>
+              <p:cNvPr id="63" name="Rectangle 19"/>
+              <p:cNvSpPr>
+                <a:spLocks noChangeArrowheads="1"/>
+              </p:cNvSpPr>
+              <p:nvPr/>
+            </p:nvSpPr>
+            <p:spPr bwMode="auto">
+              <a:xfrm>
+                <a:off x="5489677" y="5153742"/>
+                <a:ext cx="1499420" cy="983215"/>
+              </a:xfrm>
+              <a:prstGeom prst="rect">
+                <a:avLst/>
+              </a:prstGeom>
+              <a:noFill/>
+              <a:ln w="25400">
+                <a:solidFill>
+                  <a:schemeClr val="tx1"/>
+                </a:solidFill>
+                <a:miter lim="800000"/>
+                <a:headEnd/>
+                <a:tailEnd/>
+              </a:ln>
+            </p:spPr>
+            <p:txBody>
+              <a:bodyPr wrap="none" anchor="ctr"/>
+              <a:lstStyle/>
+              <a:p>
+                <a:endParaRPr lang="en-US" dirty="0"/>
+              </a:p>
+            </p:txBody>
+          </p:sp>
+        </p:grpSp>
+      </p:grpSp>
+      <p:pic>
+        <p:nvPicPr>
+          <p:cNvPr id="37" name="Picture 36" descr="latex-image-1.pdf"/>
+          <p:cNvPicPr>
+            <a:picLocks noChangeAspect="1"/>
+          </p:cNvPicPr>
+          <p:nvPr/>
+        </p:nvPicPr>
+        <p:blipFill>
+          <a:blip r:embed="rId3">
+            <a:extLst>
+              <a:ext uri="{28A0092B-C50C-407E-A947-70E740481C1C}">
+                <a14:useLocalDpi xmlns:a14="http://schemas.microsoft.com/office/drawing/2010/main" val="0"/>
+              </a:ext>
+            </a:extLst>
+          </a:blip>
+          <a:stretch>
+            <a:fillRect/>
+          </a:stretch>
+        </p:blipFill>
+        <p:spPr>
+          <a:xfrm>
+            <a:off x="5893338" y="2530257"/>
+            <a:ext cx="1079500" cy="152400"/>
+          </a:xfrm>
+          <a:prstGeom prst="rect">
+            <a:avLst/>
+          </a:prstGeom>
+        </p:spPr>
+      </p:pic>
+      <p:sp>
+        <p:nvSpPr>
+          <p:cNvPr id="64" name="Rounded Rectangle 63"/>
+          <p:cNvSpPr/>
+          <p:nvPr/>
+        </p:nvSpPr>
+        <p:spPr bwMode="auto">
+          <a:xfrm>
+            <a:off x="1522360" y="4566991"/>
+            <a:ext cx="1349455" cy="596901"/>
+          </a:xfrm>
+          <a:prstGeom prst="roundRect">
+            <a:avLst/>
+          </a:prstGeom>
+          <a:solidFill>
+            <a:schemeClr val="bg1">
+              <a:alpha val="50000"/>
+            </a:schemeClr>
+          </a:solidFill>
+          <a:ln w="9525">
+            <a:noFill/>
+            <a:miter lim="800000"/>
+            <a:headEnd/>
+            <a:tailEnd/>
+          </a:ln>
+          <a:effectLst/>
+        </p:spPr>
+        <p:txBody>
+          <a:bodyPr rtlCol="0" anchor="b">
+            <a:prstTxWarp prst="textNoShape">
+              <a:avLst/>
+            </a:prstTxWarp>
+          </a:bodyPr>
+          <a:lstStyle/>
+          <a:p>
+            <a:pPr algn="ctr">
+              <a:spcBef>
+                <a:spcPct val="0"/>
+              </a:spcBef>
+            </a:pPr>
+            <a:endParaRPr lang="en-US" sz="1600" dirty="0">
+              <a:solidFill>
+                <a:srgbClr val="000000"/>
+              </a:solidFill>
+            </a:endParaRPr>
+          </a:p>
+        </p:txBody>
+      </p:sp>
+      <p:sp>
+        <p:nvSpPr>
+          <p:cNvPr id="65" name="Rounded Rectangle 64"/>
+          <p:cNvSpPr/>
+          <p:nvPr/>
+        </p:nvSpPr>
+        <p:spPr bwMode="auto">
+          <a:xfrm>
+            <a:off x="6490877" y="4565196"/>
+            <a:ext cx="1349455" cy="596901"/>
+          </a:xfrm>
+          <a:prstGeom prst="roundRect">
+            <a:avLst/>
+          </a:prstGeom>
+          <a:solidFill>
+            <a:schemeClr val="bg1">
+              <a:alpha val="50000"/>
+            </a:schemeClr>
+          </a:solidFill>
+          <a:ln w="9525">
+            <a:noFill/>
+            <a:miter lim="800000"/>
+            <a:headEnd/>
+            <a:tailEnd/>
+          </a:ln>
+          <a:effectLst/>
+        </p:spPr>
+        <p:txBody>
+          <a:bodyPr rtlCol="0" anchor="b">
+            <a:prstTxWarp prst="textNoShape">
+              <a:avLst/>
+            </a:prstTxWarp>
+          </a:bodyPr>
+          <a:lstStyle/>
+          <a:p>
+            <a:pPr algn="ctr">
+              <a:spcBef>
+                <a:spcPct val="0"/>
+              </a:spcBef>
+            </a:pPr>
+            <a:endParaRPr lang="en-US" sz="1600" dirty="0">
+              <a:solidFill>
+                <a:srgbClr val="000000"/>
+              </a:solidFill>
+            </a:endParaRPr>
+          </a:p>
+        </p:txBody>
+      </p:sp>
+      <p:sp>
+        <p:nvSpPr>
+          <p:cNvPr id="66" name="Line 25"/>
+          <p:cNvSpPr>
+            <a:spLocks noChangeShapeType="1"/>
+          </p:cNvSpPr>
+          <p:nvPr/>
+        </p:nvSpPr>
+        <p:spPr bwMode="auto">
+          <a:xfrm flipV="1">
+            <a:off x="4415381" y="2302521"/>
+            <a:ext cx="769576" cy="0"/>
+          </a:xfrm>
+          <a:prstGeom prst="line">
+            <a:avLst/>
+          </a:prstGeom>
+          <a:noFill/>
+          <a:ln w="76200">
+            <a:solidFill>
+              <a:srgbClr val="800000"/>
+            </a:solidFill>
+            <a:round/>
+            <a:headEnd type="none" w="sm" len="sm"/>
+            <a:tailEnd type="triangle" w="med" len="lg"/>
+          </a:ln>
+        </p:spPr>
+        <p:txBody>
+          <a:bodyPr wrap="none" anchor="ctr"/>
+          <a:lstStyle/>
+          <a:p>
+            <a:r>
+              <a:rPr lang="en-US" dirty="0" smtClean="0"/>
+              <a:t> </a:t>
+            </a:r>
+            <a:endParaRPr lang="en-US" dirty="0"/>
+          </a:p>
+        </p:txBody>
+      </p:sp>
+      <p:pic>
+        <p:nvPicPr>
+          <p:cNvPr id="68" name="Picture 67"/>
+          <p:cNvPicPr>
+            <a:picLocks/>
+          </p:cNvPicPr>
+          <p:nvPr/>
+        </p:nvPicPr>
+        <p:blipFill rotWithShape="1">
+          <a:blip r:embed="rId5">
+            <a:extLst>
+              <a:ext uri="{28A0092B-C50C-407E-A947-70E740481C1C}">
+                <a14:useLocalDpi xmlns:a14="http://schemas.microsoft.com/office/drawing/2010/main" val="0"/>
+              </a:ext>
+            </a:extLst>
+          </a:blip>
+          <a:srcRect l="4030" t="26640" r="2632" b="9500"/>
+          <a:stretch/>
+        </p:blipFill>
+        <p:spPr>
+          <a:xfrm>
+            <a:off x="11493719" y="4599720"/>
+            <a:ext cx="1291959" cy="648169"/>
+          </a:xfrm>
+          <a:prstGeom prst="rect">
+            <a:avLst/>
+          </a:prstGeom>
+        </p:spPr>
+      </p:pic>
+      <p:pic>
+        <p:nvPicPr>
+          <p:cNvPr id="69" name="Picture 68"/>
+          <p:cNvPicPr>
+            <a:picLocks/>
+          </p:cNvPicPr>
+          <p:nvPr/>
+        </p:nvPicPr>
+        <p:blipFill rotWithShape="1">
+          <a:blip r:embed="rId5">
+            <a:extLst>
+              <a:ext uri="{28A0092B-C50C-407E-A947-70E740481C1C}">
+                <a14:useLocalDpi xmlns:a14="http://schemas.microsoft.com/office/drawing/2010/main" val="0"/>
+              </a:ext>
+            </a:extLst>
+          </a:blip>
+          <a:srcRect l="4030" t="26640" r="2632" b="9500"/>
+          <a:stretch/>
+        </p:blipFill>
+        <p:spPr>
+          <a:xfrm>
+            <a:off x="10313774" y="2796320"/>
+            <a:ext cx="2399353" cy="1152300"/>
+          </a:xfrm>
+          <a:prstGeom prst="rect">
+            <a:avLst/>
+          </a:prstGeom>
+        </p:spPr>
+      </p:pic>
+      <p:sp>
+        <p:nvSpPr>
+          <p:cNvPr id="76" name="Freeform 6"/>
+          <p:cNvSpPr>
+            <a:spLocks/>
+          </p:cNvSpPr>
+          <p:nvPr/>
+        </p:nvSpPr>
+        <p:spPr bwMode="auto">
+          <a:xfrm>
+            <a:off x="11712005" y="3611585"/>
+            <a:ext cx="13187" cy="13373"/>
+          </a:xfrm>
+          <a:custGeom>
+            <a:avLst/>
+            <a:gdLst>
+              <a:gd name="T0" fmla="*/ 0 w 17"/>
+              <a:gd name="T1" fmla="*/ 0 h 17"/>
+              <a:gd name="T2" fmla="*/ 2147483647 w 17"/>
+              <a:gd name="T3" fmla="*/ 0 h 17"/>
+              <a:gd name="T4" fmla="*/ 2147483647 w 17"/>
+              <a:gd name="T5" fmla="*/ 2147483647 h 17"/>
+              <a:gd name="T6" fmla="*/ 0 w 17"/>
+              <a:gd name="T7" fmla="*/ 2147483647 h 17"/>
+              <a:gd name="T8" fmla="*/ 0 w 17"/>
+              <a:gd name="T9" fmla="*/ 0 h 17"/>
+              <a:gd name="T10" fmla="*/ 0 60000 65536"/>
+              <a:gd name="T11" fmla="*/ 0 60000 65536"/>
+              <a:gd name="T12" fmla="*/ 0 60000 65536"/>
+              <a:gd name="T13" fmla="*/ 0 60000 65536"/>
+              <a:gd name="T14" fmla="*/ 0 60000 65536"/>
+              <a:gd name="T15" fmla="*/ 0 w 17"/>
+              <a:gd name="T16" fmla="*/ 0 h 17"/>
+              <a:gd name="T17" fmla="*/ 17 w 17"/>
+              <a:gd name="T18" fmla="*/ 17 h 17"/>
+            </a:gdLst>
+            <a:ahLst/>
+            <a:cxnLst>
+              <a:cxn ang="T10">
+                <a:pos x="T0" y="T1"/>
+              </a:cxn>
+              <a:cxn ang="T11">
+                <a:pos x="T2" y="T3"/>
+              </a:cxn>
+              <a:cxn ang="T12">
+                <a:pos x="T4" y="T5"/>
+              </a:cxn>
+              <a:cxn ang="T13">
+                <a:pos x="T6" y="T7"/>
+              </a:cxn>
+              <a:cxn ang="T14">
+                <a:pos x="T8" y="T9"/>
+              </a:cxn>
+            </a:cxnLst>
+            <a:rect l="T15" t="T16" r="T17" b="T18"/>
+            <a:pathLst>
+              <a:path w="17" h="17">
+                <a:moveTo>
+                  <a:pt x="0" y="0"/>
+                </a:moveTo>
+                <a:lnTo>
+                  <a:pt x="16" y="0"/>
+                </a:lnTo>
+                <a:lnTo>
+                  <a:pt x="16" y="16"/>
+                </a:lnTo>
+                <a:lnTo>
+                  <a:pt x="0" y="16"/>
+                </a:lnTo>
+                <a:lnTo>
+                  <a:pt x="0" y="0"/>
+                </a:lnTo>
+              </a:path>
+            </a:pathLst>
+          </a:custGeom>
+          <a:solidFill>
+            <a:srgbClr val="FFFFFF"/>
+          </a:solidFill>
+          <a:ln w="9525" cap="rnd">
+            <a:noFill/>
+            <a:round/>
+            <a:headEnd type="none" w="sm" len="sm"/>
+            <a:tailEnd type="none" w="sm" len="sm"/>
+          </a:ln>
+        </p:spPr>
+        <p:txBody>
+          <a:bodyPr/>
+          <a:lstStyle/>
+          <a:p>
+            <a:endParaRPr lang="en-US" dirty="0"/>
+          </a:p>
+        </p:txBody>
+      </p:sp>
+      <p:sp>
+        <p:nvSpPr>
+          <p:cNvPr id="77" name="Freeform 17"/>
+          <p:cNvSpPr>
+            <a:spLocks/>
+          </p:cNvSpPr>
+          <p:nvPr/>
+        </p:nvSpPr>
+        <p:spPr bwMode="auto">
+          <a:xfrm>
+            <a:off x="11558476" y="4808418"/>
+            <a:ext cx="12245" cy="13373"/>
+          </a:xfrm>
+          <a:custGeom>
+            <a:avLst/>
+            <a:gdLst>
+              <a:gd name="T0" fmla="*/ 0 w 17"/>
+              <a:gd name="T1" fmla="*/ 0 h 17"/>
+              <a:gd name="T2" fmla="*/ 2147483647 w 17"/>
+              <a:gd name="T3" fmla="*/ 0 h 17"/>
+              <a:gd name="T4" fmla="*/ 2147483647 w 17"/>
+              <a:gd name="T5" fmla="*/ 2147483647 h 17"/>
+              <a:gd name="T6" fmla="*/ 0 w 17"/>
+              <a:gd name="T7" fmla="*/ 2147483647 h 17"/>
+              <a:gd name="T8" fmla="*/ 0 w 17"/>
+              <a:gd name="T9" fmla="*/ 0 h 17"/>
+              <a:gd name="T10" fmla="*/ 0 60000 65536"/>
+              <a:gd name="T11" fmla="*/ 0 60000 65536"/>
+              <a:gd name="T12" fmla="*/ 0 60000 65536"/>
+              <a:gd name="T13" fmla="*/ 0 60000 65536"/>
+              <a:gd name="T14" fmla="*/ 0 60000 65536"/>
+              <a:gd name="T15" fmla="*/ 0 w 17"/>
+              <a:gd name="T16" fmla="*/ 0 h 17"/>
+              <a:gd name="T17" fmla="*/ 17 w 17"/>
+              <a:gd name="T18" fmla="*/ 17 h 17"/>
+            </a:gdLst>
+            <a:ahLst/>
+            <a:cxnLst>
+              <a:cxn ang="T10">
+                <a:pos x="T0" y="T1"/>
+              </a:cxn>
+              <a:cxn ang="T11">
+                <a:pos x="T2" y="T3"/>
+              </a:cxn>
+              <a:cxn ang="T12">
+                <a:pos x="T4" y="T5"/>
+              </a:cxn>
+              <a:cxn ang="T13">
+                <a:pos x="T6" y="T7"/>
+              </a:cxn>
+              <a:cxn ang="T14">
+                <a:pos x="T8" y="T9"/>
+              </a:cxn>
+            </a:cxnLst>
+            <a:rect l="T15" t="T16" r="T17" b="T18"/>
+            <a:pathLst>
+              <a:path w="17" h="17">
+                <a:moveTo>
+                  <a:pt x="0" y="0"/>
+                </a:moveTo>
+                <a:lnTo>
+                  <a:pt x="16" y="0"/>
+                </a:lnTo>
+                <a:lnTo>
+                  <a:pt x="16" y="16"/>
+                </a:lnTo>
+                <a:lnTo>
+                  <a:pt x="0" y="16"/>
+                </a:lnTo>
+                <a:lnTo>
+                  <a:pt x="0" y="0"/>
+                </a:lnTo>
+              </a:path>
+            </a:pathLst>
+          </a:custGeom>
+          <a:solidFill>
+            <a:srgbClr val="FFFFFF"/>
+          </a:solidFill>
+          <a:ln w="9525" cap="rnd">
+            <a:noFill/>
+            <a:round/>
+            <a:headEnd type="none" w="sm" len="sm"/>
+            <a:tailEnd type="none" w="sm" len="sm"/>
+          </a:ln>
+        </p:spPr>
+        <p:txBody>
+          <a:bodyPr/>
+          <a:lstStyle/>
+          <a:p>
+            <a:endParaRPr lang="en-US" dirty="0"/>
+          </a:p>
+        </p:txBody>
+      </p:sp>
+      <p:sp>
+        <p:nvSpPr>
+          <p:cNvPr id="78" name="Rectangle 23"/>
+          <p:cNvSpPr>
+            <a:spLocks noChangeArrowheads="1"/>
+          </p:cNvSpPr>
+          <p:nvPr/>
+        </p:nvSpPr>
+        <p:spPr bwMode="auto">
+          <a:xfrm>
+            <a:off x="13895927" y="2962708"/>
+            <a:ext cx="224172" cy="146142"/>
+          </a:xfrm>
+          <a:prstGeom prst="rect">
+            <a:avLst/>
+          </a:prstGeom>
+          <a:noFill/>
+          <a:ln w="25400">
+            <a:solidFill>
+              <a:schemeClr val="tx1"/>
+            </a:solidFill>
+            <a:miter lim="800000"/>
+            <a:headEnd/>
+            <a:tailEnd/>
+          </a:ln>
+        </p:spPr>
+        <p:txBody>
+          <a:bodyPr wrap="none" anchor="ctr"/>
+          <a:lstStyle/>
+          <a:p>
+            <a:endParaRPr lang="en-US" dirty="0"/>
+          </a:p>
+        </p:txBody>
+      </p:sp>
+      <p:sp>
+        <p:nvSpPr>
+          <p:cNvPr id="80" name="Line 26"/>
+          <p:cNvSpPr>
+            <a:spLocks noChangeShapeType="1"/>
+          </p:cNvSpPr>
+          <p:nvPr/>
+        </p:nvSpPr>
+        <p:spPr bwMode="auto">
+          <a:xfrm>
+            <a:off x="12920464" y="4842804"/>
+            <a:ext cx="390889" cy="699187"/>
+          </a:xfrm>
+          <a:prstGeom prst="line">
+            <a:avLst/>
+          </a:prstGeom>
+          <a:noFill/>
+          <a:ln w="25400">
+            <a:solidFill>
+              <a:schemeClr val="tx1"/>
+            </a:solidFill>
+            <a:prstDash val="dash"/>
+            <a:round/>
+            <a:headEnd type="none" w="sm" len="sm"/>
+            <a:tailEnd type="stealth" w="med" len="lg"/>
+          </a:ln>
+        </p:spPr>
+        <p:txBody>
+          <a:bodyPr wrap="none" anchor="ctr"/>
+          <a:lstStyle/>
+          <a:p>
+            <a:endParaRPr lang="en-US" dirty="0"/>
+          </a:p>
+        </p:txBody>
+      </p:sp>
+      <p:grpSp>
+        <p:nvGrpSpPr>
+          <p:cNvPr id="34" name="Group 33"/>
+          <p:cNvGrpSpPr/>
+          <p:nvPr/>
+        </p:nvGrpSpPr>
+        <p:grpSpPr>
+          <a:xfrm rot="20901985">
+            <a:off x="13102988" y="3217138"/>
+            <a:ext cx="1122746" cy="2194989"/>
+            <a:chOff x="13318888" y="3344138"/>
+            <a:chExt cx="1122746" cy="2194989"/>
+          </a:xfrm>
+        </p:grpSpPr>
+        <p:sp>
+          <p:nvSpPr>
+            <p:cNvPr id="79" name="Line 25"/>
+            <p:cNvSpPr>
+              <a:spLocks noChangeShapeType="1"/>
+            </p:cNvSpPr>
+            <p:nvPr/>
+          </p:nvSpPr>
+          <p:spPr bwMode="auto">
+            <a:xfrm flipV="1">
+              <a:off x="13806793" y="3344138"/>
+              <a:ext cx="634841" cy="1225488"/>
+            </a:xfrm>
+            <a:prstGeom prst="line">
+              <a:avLst/>
+            </a:prstGeom>
+            <a:noFill/>
+            <a:ln w="25400">
+              <a:solidFill>
+                <a:schemeClr val="tx1"/>
+              </a:solidFill>
+              <a:round/>
+              <a:headEnd type="none" w="sm" len="sm"/>
+              <a:tailEnd type="stealth" w="med" len="lg"/>
+            </a:ln>
+          </p:spPr>
+          <p:txBody>
+            <a:bodyPr wrap="none" anchor="ctr"/>
+            <a:lstStyle/>
+            <a:p>
+              <a:endParaRPr lang="en-US" dirty="0"/>
+            </a:p>
+          </p:txBody>
+        </p:sp>
+        <p:sp>
+          <p:nvSpPr>
+            <p:cNvPr id="81" name="Line 27"/>
+            <p:cNvSpPr>
+              <a:spLocks noChangeShapeType="1"/>
+            </p:cNvSpPr>
+            <p:nvPr/>
+          </p:nvSpPr>
+          <p:spPr bwMode="auto">
+            <a:xfrm flipV="1">
+              <a:off x="13318888" y="4720542"/>
+              <a:ext cx="413494" cy="818585"/>
+            </a:xfrm>
+            <a:prstGeom prst="line">
+              <a:avLst/>
+            </a:prstGeom>
+            <a:noFill/>
+            <a:ln w="25400">
+              <a:solidFill>
+                <a:schemeClr val="tx1"/>
+              </a:solidFill>
+              <a:prstDash val="dash"/>
+              <a:round/>
+              <a:headEnd type="none" w="sm" len="sm"/>
+              <a:tailEnd type="stealth" w="med" len="lg"/>
+            </a:ln>
+          </p:spPr>
+          <p:txBody>
+            <a:bodyPr wrap="none" anchor="ctr"/>
+            <a:lstStyle/>
+            <a:p>
+              <a:endParaRPr lang="en-US" dirty="0"/>
+            </a:p>
+          </p:txBody>
+        </p:sp>
+      </p:grpSp>
+      <p:sp>
+        <p:nvSpPr>
+          <p:cNvPr id="82" name="Rectangle 28"/>
+          <p:cNvSpPr>
+            <a:spLocks noChangeArrowheads="1"/>
+          </p:cNvSpPr>
+          <p:nvPr/>
+        </p:nvSpPr>
+        <p:spPr bwMode="auto">
+          <a:xfrm>
+            <a:off x="13472214" y="4481681"/>
+            <a:ext cx="224172" cy="145187"/>
+          </a:xfrm>
+          <a:prstGeom prst="rect">
+            <a:avLst/>
+          </a:prstGeom>
+          <a:noFill/>
+          <a:ln w="25400">
+            <a:solidFill>
+              <a:schemeClr val="tx1"/>
+            </a:solidFill>
+            <a:miter lim="800000"/>
+            <a:headEnd/>
+            <a:tailEnd/>
+          </a:ln>
+        </p:spPr>
+        <p:txBody>
+          <a:bodyPr wrap="none" anchor="ctr"/>
+          <a:lstStyle/>
+          <a:p>
+            <a:endParaRPr lang="en-US" dirty="0"/>
+          </a:p>
+        </p:txBody>
+      </p:sp>
+      <p:sp>
+        <p:nvSpPr>
+          <p:cNvPr id="83" name="Rectangle 29"/>
+          <p:cNvSpPr>
+            <a:spLocks noChangeArrowheads="1"/>
+          </p:cNvSpPr>
+          <p:nvPr/>
+        </p:nvSpPr>
+        <p:spPr bwMode="auto">
+          <a:xfrm>
+            <a:off x="13211511" y="5546769"/>
+            <a:ext cx="224172" cy="146142"/>
+          </a:xfrm>
+          <a:prstGeom prst="rect">
+            <a:avLst/>
+          </a:prstGeom>
+          <a:noFill/>
+          <a:ln w="25400">
+            <a:solidFill>
+              <a:schemeClr val="tx1"/>
+            </a:solidFill>
+            <a:miter lim="800000"/>
+            <a:headEnd/>
+            <a:tailEnd/>
+          </a:ln>
+        </p:spPr>
+        <p:txBody>
+          <a:bodyPr wrap="none" anchor="ctr"/>
+          <a:lstStyle/>
+          <a:p>
+            <a:endParaRPr lang="en-US" dirty="0"/>
+          </a:p>
+        </p:txBody>
+      </p:sp>
+      <p:sp>
+        <p:nvSpPr>
+          <p:cNvPr id="84" name="Line 24"/>
+          <p:cNvSpPr>
+            <a:spLocks noChangeShapeType="1"/>
+          </p:cNvSpPr>
+          <p:nvPr/>
+        </p:nvSpPr>
+        <p:spPr bwMode="auto">
+          <a:xfrm>
+            <a:off x="12570077" y="4208569"/>
+            <a:ext cx="198741" cy="358190"/>
+          </a:xfrm>
+          <a:prstGeom prst="line">
+            <a:avLst/>
+          </a:prstGeom>
+          <a:noFill/>
+          <a:ln w="25400">
+            <a:solidFill>
+              <a:schemeClr val="tx1"/>
+            </a:solidFill>
+            <a:round/>
+            <a:headEnd type="none" w="sm" len="sm"/>
+            <a:tailEnd type="stealth" w="med" len="lg"/>
+          </a:ln>
+        </p:spPr>
+        <p:txBody>
+          <a:bodyPr wrap="none" anchor="ctr"/>
+          <a:lstStyle/>
+          <a:p>
+            <a:endParaRPr lang="en-US" dirty="0"/>
+          </a:p>
+        </p:txBody>
+      </p:sp>
+      <p:sp>
+        <p:nvSpPr>
+          <p:cNvPr id="87" name="Text Box 30"/>
+          <p:cNvSpPr txBox="1">
+            <a:spLocks noChangeArrowheads="1"/>
+          </p:cNvSpPr>
+          <p:nvPr/>
+        </p:nvSpPr>
+        <p:spPr bwMode="auto">
+          <a:xfrm>
+            <a:off x="12345773" y="2094859"/>
+            <a:ext cx="1879432" cy="400110"/>
+          </a:xfrm>
+          <a:prstGeom prst="rect">
+            <a:avLst/>
+          </a:prstGeom>
+          <a:solidFill>
+            <a:schemeClr val="bg1"/>
+          </a:solidFill>
+          <a:ln w="12700">
+            <a:noFill/>
+            <a:miter lim="800000"/>
+            <a:headEnd type="none" w="sm" len="sm"/>
+            <a:tailEnd type="none" w="sm" len="sm"/>
+          </a:ln>
+        </p:spPr>
+        <p:txBody>
+          <a:bodyPr wrap="square">
+            <a:spAutoFit/>
+          </a:bodyPr>
+          <a:lstStyle/>
+          <a:p>
+            <a:pPr>
+              <a:spcBef>
+                <a:spcPct val="0"/>
+              </a:spcBef>
+            </a:pPr>
+            <a:r>
+              <a:rPr lang="en-US" sz="2000" b="1" dirty="0" smtClean="0">
+                <a:solidFill>
+                  <a:srgbClr val="800000"/>
+                </a:solidFill>
+              </a:rPr>
+              <a:t>Iteration 2</a:t>
+            </a:r>
+            <a:endParaRPr lang="en-US" sz="2000" dirty="0">
+              <a:solidFill>
+                <a:srgbClr val="800000"/>
+              </a:solidFill>
+            </a:endParaRPr>
+          </a:p>
+        </p:txBody>
+      </p:sp>
+      <p:sp>
+        <p:nvSpPr>
+          <p:cNvPr id="89" name="Rectangle 19"/>
+          <p:cNvSpPr>
+            <a:spLocks noChangeArrowheads="1"/>
+          </p:cNvSpPr>
+          <p:nvPr/>
+        </p:nvSpPr>
+        <p:spPr bwMode="auto">
+          <a:xfrm>
+            <a:off x="10036682" y="2496138"/>
+            <a:ext cx="2680419" cy="1719129"/>
+          </a:xfrm>
+          <a:prstGeom prst="rect">
+            <a:avLst/>
+          </a:prstGeom>
+          <a:noFill/>
+          <a:ln w="25400">
+            <a:solidFill>
+              <a:schemeClr val="tx1"/>
+            </a:solidFill>
+            <a:miter lim="800000"/>
+            <a:headEnd/>
+            <a:tailEnd/>
+          </a:ln>
+        </p:spPr>
+        <p:txBody>
+          <a:bodyPr wrap="none" anchor="ctr"/>
+          <a:lstStyle/>
+          <a:p>
+            <a:endParaRPr lang="en-US" dirty="0"/>
+          </a:p>
+        </p:txBody>
+      </p:sp>
+      <p:sp>
+        <p:nvSpPr>
+          <p:cNvPr id="90" name="TextBox 89"/>
+          <p:cNvSpPr txBox="1"/>
+          <p:nvPr/>
+        </p:nvSpPr>
+        <p:spPr>
+          <a:xfrm rot="16993905">
+            <a:off x="9907190" y="3525107"/>
+            <a:ext cx="571923" cy="323165"/>
+          </a:xfrm>
+          <a:prstGeom prst="rect">
+            <a:avLst/>
+          </a:prstGeom>
+          <a:noFill/>
+        </p:spPr>
+        <p:txBody>
+          <a:bodyPr wrap="none" rtlCol="0">
+            <a:spAutoFit/>
+          </a:bodyPr>
+          <a:lstStyle/>
+          <a:p>
+            <a:r>
+              <a:rPr lang="en-US" sz="1500" dirty="0" smtClean="0">
+                <a:solidFill>
+                  <a:srgbClr val="800000"/>
+                </a:solidFill>
+              </a:rPr>
+              <a:t>Time</a:t>
+            </a:r>
+            <a:endParaRPr lang="en-US" sz="1500" dirty="0">
+              <a:solidFill>
+                <a:srgbClr val="800000"/>
+              </a:solidFill>
+            </a:endParaRPr>
+          </a:p>
+        </p:txBody>
+      </p:sp>
+      <p:sp>
+        <p:nvSpPr>
+          <p:cNvPr id="91" name="TextBox 90"/>
+          <p:cNvSpPr txBox="1"/>
+          <p:nvPr/>
+        </p:nvSpPr>
+        <p:spPr>
+          <a:xfrm rot="20878399">
+            <a:off x="11069870" y="3610013"/>
+            <a:ext cx="643306" cy="323165"/>
+          </a:xfrm>
+          <a:prstGeom prst="rect">
+            <a:avLst/>
+          </a:prstGeom>
+          <a:noFill/>
+        </p:spPr>
+        <p:txBody>
+          <a:bodyPr wrap="none" rtlCol="0">
+            <a:spAutoFit/>
+          </a:bodyPr>
+          <a:lstStyle/>
+          <a:p>
+            <a:r>
+              <a:rPr lang="en-US" sz="1500" dirty="0" smtClean="0">
+                <a:solidFill>
+                  <a:srgbClr val="800000"/>
+                </a:solidFill>
+              </a:rPr>
+              <a:t>Space</a:t>
+            </a:r>
+            <a:endParaRPr lang="en-US" sz="1500" dirty="0">
+              <a:solidFill>
+                <a:srgbClr val="800000"/>
+              </a:solidFill>
+            </a:endParaRPr>
+          </a:p>
+        </p:txBody>
+      </p:sp>
+      <p:sp>
+        <p:nvSpPr>
+          <p:cNvPr id="92" name="Line 25"/>
+          <p:cNvSpPr>
+            <a:spLocks noChangeShapeType="1"/>
+          </p:cNvSpPr>
+          <p:nvPr/>
+        </p:nvSpPr>
+        <p:spPr bwMode="auto">
+          <a:xfrm flipV="1">
+            <a:off x="10290336" y="3067824"/>
+            <a:ext cx="122165" cy="407474"/>
+          </a:xfrm>
+          <a:prstGeom prst="line">
+            <a:avLst/>
+          </a:prstGeom>
+          <a:noFill/>
+          <a:ln w="28575">
+            <a:solidFill>
+              <a:srgbClr val="800000"/>
+            </a:solidFill>
+            <a:round/>
+            <a:headEnd type="none" w="sm" len="sm"/>
+            <a:tailEnd type="triangle" w="med" len="lg"/>
+          </a:ln>
+        </p:spPr>
+        <p:txBody>
+          <a:bodyPr wrap="none" anchor="ctr"/>
+          <a:lstStyle/>
+          <a:p>
+            <a:endParaRPr lang="en-US" dirty="0"/>
+          </a:p>
+        </p:txBody>
+      </p:sp>
+      <p:sp>
+        <p:nvSpPr>
+          <p:cNvPr id="93" name="Line 25"/>
+          <p:cNvSpPr>
+            <a:spLocks noChangeShapeType="1"/>
+          </p:cNvSpPr>
+          <p:nvPr/>
+        </p:nvSpPr>
+        <p:spPr bwMode="auto">
+          <a:xfrm flipV="1">
+            <a:off x="11725067" y="3590166"/>
+            <a:ext cx="515661" cy="145445"/>
+          </a:xfrm>
+          <a:prstGeom prst="line">
+            <a:avLst/>
+          </a:prstGeom>
+          <a:noFill/>
+          <a:ln w="28575">
+            <a:solidFill>
+              <a:srgbClr val="800000"/>
+            </a:solidFill>
+            <a:round/>
+            <a:headEnd type="none" w="sm" len="sm"/>
+            <a:tailEnd type="triangle" w="med" len="lg"/>
+          </a:ln>
+        </p:spPr>
+        <p:txBody>
+          <a:bodyPr wrap="none" anchor="ctr"/>
+          <a:lstStyle/>
+          <a:p>
+            <a:endParaRPr lang="en-US" dirty="0"/>
+          </a:p>
+        </p:txBody>
+      </p:sp>
+      <p:sp>
+        <p:nvSpPr>
+          <p:cNvPr id="96" name="Rectangle 19"/>
+          <p:cNvSpPr>
+            <a:spLocks noChangeArrowheads="1"/>
+          </p:cNvSpPr>
+          <p:nvPr/>
+        </p:nvSpPr>
+        <p:spPr bwMode="auto">
+          <a:xfrm>
+            <a:off x="11399043" y="4571354"/>
+            <a:ext cx="1499420" cy="983215"/>
+          </a:xfrm>
+          <a:prstGeom prst="rect">
+            <a:avLst/>
+          </a:prstGeom>
+          <a:noFill/>
+          <a:ln w="25400">
+            <a:solidFill>
+              <a:schemeClr val="tx1"/>
+            </a:solidFill>
+            <a:miter lim="800000"/>
+            <a:headEnd/>
+            <a:tailEnd/>
+          </a:ln>
+        </p:spPr>
+        <p:txBody>
+          <a:bodyPr wrap="none" anchor="ctr"/>
+          <a:lstStyle/>
+          <a:p>
+            <a:endParaRPr lang="en-US" dirty="0"/>
+          </a:p>
+        </p:txBody>
+      </p:sp>
+      <p:pic>
+        <p:nvPicPr>
+          <p:cNvPr id="72" name="Picture 71" descr="latex-image-1.pdf"/>
+          <p:cNvPicPr>
+            <a:picLocks noChangeAspect="1"/>
+          </p:cNvPicPr>
+          <p:nvPr/>
+        </p:nvPicPr>
+        <p:blipFill>
+          <a:blip r:embed="rId3">
+            <a:extLst>
+              <a:ext uri="{28A0092B-C50C-407E-A947-70E740481C1C}">
+                <a14:useLocalDpi xmlns:a14="http://schemas.microsoft.com/office/drawing/2010/main" val="0"/>
+              </a:ext>
+            </a:extLst>
+          </a:blip>
+          <a:stretch>
+            <a:fillRect/>
+          </a:stretch>
+        </p:blipFill>
+        <p:spPr>
+          <a:xfrm>
+            <a:off x="10870842" y="2570028"/>
+            <a:ext cx="1079500" cy="152400"/>
+          </a:xfrm>
+          <a:prstGeom prst="rect">
+            <a:avLst/>
+          </a:prstGeom>
+        </p:spPr>
+      </p:pic>
+      <p:sp>
+        <p:nvSpPr>
+          <p:cNvPr id="127" name="Line 25"/>
+          <p:cNvSpPr>
+            <a:spLocks noChangeShapeType="1"/>
+          </p:cNvSpPr>
+          <p:nvPr/>
+        </p:nvSpPr>
+        <p:spPr bwMode="auto">
+          <a:xfrm flipV="1">
+            <a:off x="9440871" y="2306342"/>
+            <a:ext cx="769576" cy="0"/>
+          </a:xfrm>
+          <a:prstGeom prst="line">
+            <a:avLst/>
+          </a:prstGeom>
+          <a:noFill/>
+          <a:ln w="76200">
+            <a:solidFill>
+              <a:srgbClr val="800000"/>
+            </a:solidFill>
+            <a:round/>
+            <a:headEnd type="none" w="sm" len="sm"/>
+            <a:tailEnd type="triangle" w="med" len="lg"/>
+          </a:ln>
+        </p:spPr>
+        <p:txBody>
+          <a:bodyPr wrap="none" anchor="ctr"/>
+          <a:lstStyle/>
+          <a:p>
+            <a:endParaRPr lang="en-US" dirty="0"/>
+          </a:p>
+        </p:txBody>
+      </p:sp>
+      <p:sp>
+        <p:nvSpPr>
+          <p:cNvPr id="128" name="Rounded Rectangle 127"/>
+          <p:cNvSpPr/>
+          <p:nvPr/>
+        </p:nvSpPr>
+        <p:spPr bwMode="auto">
+          <a:xfrm>
+            <a:off x="11411743" y="4611222"/>
+            <a:ext cx="1349455" cy="596901"/>
+          </a:xfrm>
+          <a:prstGeom prst="roundRect">
+            <a:avLst/>
+          </a:prstGeom>
+          <a:solidFill>
+            <a:schemeClr val="bg1">
+              <a:alpha val="50000"/>
+            </a:schemeClr>
+          </a:solidFill>
+          <a:ln w="9525">
+            <a:noFill/>
+            <a:miter lim="800000"/>
+            <a:headEnd/>
+            <a:tailEnd/>
+          </a:ln>
+          <a:effectLst/>
+        </p:spPr>
+        <p:txBody>
+          <a:bodyPr rtlCol="0" anchor="b">
+            <a:prstTxWarp prst="textNoShape">
+              <a:avLst/>
+            </a:prstTxWarp>
+          </a:bodyPr>
+          <a:lstStyle/>
+          <a:p>
+            <a:pPr algn="ctr">
+              <a:spcBef>
+                <a:spcPct val="0"/>
+              </a:spcBef>
+            </a:pPr>
+            <a:endParaRPr lang="en-US" sz="1600" dirty="0">
+              <a:solidFill>
+                <a:srgbClr val="000000"/>
+              </a:solidFill>
+            </a:endParaRPr>
+          </a:p>
+        </p:txBody>
+      </p:sp>
+    </p:spTree>
+    <p:extLst>
+      <p:ext uri="{BB962C8B-B14F-4D97-AF65-F5344CB8AC3E}">
+        <p14:creationId xmlns:p14="http://schemas.microsoft.com/office/powerpoint/2010/main" val="2982781011"/>
+      </p:ext>
+    </p:extLst>
+  </p:cSld>
+  <p:clrMapOvr>
+    <a:masterClrMapping/>
+  </p:clrMapOvr>
+</p:sld>
+</file>
+
 <file path=ppt/theme/theme1.xml><?xml version="1.0" encoding="utf-8"?>
 <a:theme xmlns:a="http://schemas.openxmlformats.org/drawingml/2006/main" name="Office Theme">
   <a:themeElements>

</xml_diff>